<commit_message>
actualizacion y mejora de reporte y presentacion de hallazgos
</commit_message>
<xml_diff>
--- a/reports/Presentacion_delitoHMO.pptx
+++ b/reports/Presentacion_delitoHMO.pptx
@@ -5,10 +5,10 @@
     <p:sldMasterId id="2147483648" r:id="rId1"/>
   </p:sldMasterIdLst>
   <p:sldIdLst>
-    <p:sldId id="256" r:id="rId2"/>
+    <p:sldId id="263" r:id="rId2"/>
     <p:sldId id="257" r:id="rId3"/>
-    <p:sldId id="258" r:id="rId4"/>
-    <p:sldId id="259" r:id="rId5"/>
+    <p:sldId id="259" r:id="rId4"/>
+    <p:sldId id="258" r:id="rId5"/>
     <p:sldId id="260" r:id="rId6"/>
   </p:sldIdLst>
   <p:sldSz cx="12192000" cy="6858000"/>
@@ -108,6 +108,11 @@
       </a:defRPr>
     </a:lvl9pPr>
   </p:defaultTextStyle>
+  <p:extLst>
+    <p:ext uri="{EFAFB233-063F-42B5-8137-9DF3F51BA10A}">
+      <p15:sldGuideLst xmlns:p15="http://schemas.microsoft.com/office/powerpoint/2012/main"/>
+    </p:ext>
+  </p:extLst>
 </p:presentation>
 </file>
 
@@ -260,7 +265,7 @@
           <a:p>
             <a:fld id="{250009C9-B916-49E4-84E0-6BD5CDDEEAF3}" type="datetimeFigureOut">
               <a:rPr lang="es-MX" smtClean="0"/>
-              <a:t>10/11/2025</a:t>
+              <a:t>18/11/2025</a:t>
             </a:fld>
             <a:endParaRPr lang="es-MX"/>
           </a:p>
@@ -460,7 +465,7 @@
           <a:p>
             <a:fld id="{250009C9-B916-49E4-84E0-6BD5CDDEEAF3}" type="datetimeFigureOut">
               <a:rPr lang="es-MX" smtClean="0"/>
-              <a:t>10/11/2025</a:t>
+              <a:t>18/11/2025</a:t>
             </a:fld>
             <a:endParaRPr lang="es-MX"/>
           </a:p>
@@ -670,7 +675,7 @@
           <a:p>
             <a:fld id="{250009C9-B916-49E4-84E0-6BD5CDDEEAF3}" type="datetimeFigureOut">
               <a:rPr lang="es-MX" smtClean="0"/>
-              <a:t>10/11/2025</a:t>
+              <a:t>18/11/2025</a:t>
             </a:fld>
             <a:endParaRPr lang="es-MX"/>
           </a:p>
@@ -870,7 +875,7 @@
           <a:p>
             <a:fld id="{250009C9-B916-49E4-84E0-6BD5CDDEEAF3}" type="datetimeFigureOut">
               <a:rPr lang="es-MX" smtClean="0"/>
-              <a:t>10/11/2025</a:t>
+              <a:t>18/11/2025</a:t>
             </a:fld>
             <a:endParaRPr lang="es-MX"/>
           </a:p>
@@ -1146,7 +1151,7 @@
           <a:p>
             <a:fld id="{250009C9-B916-49E4-84E0-6BD5CDDEEAF3}" type="datetimeFigureOut">
               <a:rPr lang="es-MX" smtClean="0"/>
-              <a:t>10/11/2025</a:t>
+              <a:t>18/11/2025</a:t>
             </a:fld>
             <a:endParaRPr lang="es-MX"/>
           </a:p>
@@ -1414,7 +1419,7 @@
           <a:p>
             <a:fld id="{250009C9-B916-49E4-84E0-6BD5CDDEEAF3}" type="datetimeFigureOut">
               <a:rPr lang="es-MX" smtClean="0"/>
-              <a:t>10/11/2025</a:t>
+              <a:t>18/11/2025</a:t>
             </a:fld>
             <a:endParaRPr lang="es-MX"/>
           </a:p>
@@ -1829,7 +1834,7 @@
           <a:p>
             <a:fld id="{250009C9-B916-49E4-84E0-6BD5CDDEEAF3}" type="datetimeFigureOut">
               <a:rPr lang="es-MX" smtClean="0"/>
-              <a:t>10/11/2025</a:t>
+              <a:t>18/11/2025</a:t>
             </a:fld>
             <a:endParaRPr lang="es-MX"/>
           </a:p>
@@ -1971,7 +1976,7 @@
           <a:p>
             <a:fld id="{250009C9-B916-49E4-84E0-6BD5CDDEEAF3}" type="datetimeFigureOut">
               <a:rPr lang="es-MX" smtClean="0"/>
-              <a:t>10/11/2025</a:t>
+              <a:t>18/11/2025</a:t>
             </a:fld>
             <a:endParaRPr lang="es-MX"/>
           </a:p>
@@ -2084,7 +2089,7 @@
           <a:p>
             <a:fld id="{250009C9-B916-49E4-84E0-6BD5CDDEEAF3}" type="datetimeFigureOut">
               <a:rPr lang="es-MX" smtClean="0"/>
-              <a:t>10/11/2025</a:t>
+              <a:t>18/11/2025</a:t>
             </a:fld>
             <a:endParaRPr lang="es-MX"/>
           </a:p>
@@ -2397,7 +2402,7 @@
           <a:p>
             <a:fld id="{250009C9-B916-49E4-84E0-6BD5CDDEEAF3}" type="datetimeFigureOut">
               <a:rPr lang="es-MX" smtClean="0"/>
-              <a:t>10/11/2025</a:t>
+              <a:t>18/11/2025</a:t>
             </a:fld>
             <a:endParaRPr lang="es-MX"/>
           </a:p>
@@ -2686,7 +2691,7 @@
           <a:p>
             <a:fld id="{250009C9-B916-49E4-84E0-6BD5CDDEEAF3}" type="datetimeFigureOut">
               <a:rPr lang="es-MX" smtClean="0"/>
-              <a:t>10/11/2025</a:t>
+              <a:t>18/11/2025</a:t>
             </a:fld>
             <a:endParaRPr lang="es-MX"/>
           </a:p>
@@ -2763,9 +2768,14 @@
 <p:sldMaster xmlns:a="http://schemas.openxmlformats.org/drawingml/2006/main" xmlns:r="http://schemas.openxmlformats.org/officeDocument/2006/relationships" xmlns:p="http://schemas.openxmlformats.org/presentationml/2006/main">
   <p:cSld>
     <p:bg>
-      <p:bgRef idx="1001">
-        <a:schemeClr val="bg1"/>
-      </p:bgRef>
+      <p:bgPr>
+        <a:solidFill>
+          <a:schemeClr val="bg1">
+            <a:alpha val="56863"/>
+          </a:schemeClr>
+        </a:solidFill>
+        <a:effectLst/>
+      </p:bgPr>
     </p:bg>
     <p:spTree>
       <p:nvGrpSpPr>
@@ -2929,7 +2939,7 @@
           <a:p>
             <a:fld id="{250009C9-B916-49E4-84E0-6BD5CDDEEAF3}" type="datetimeFigureOut">
               <a:rPr lang="es-MX" smtClean="0"/>
-              <a:t>10/11/2025</a:t>
+              <a:t>18/11/2025</a:t>
             </a:fld>
             <a:endParaRPr lang="es-MX"/>
           </a:p>
@@ -3334,7 +3344,13 @@
   <p:cSld>
     <p:spTree>
       <p:nvGrpSpPr>
-        <p:cNvPr id="1" name=""/>
+        <p:cNvPr id="1" name="">
+          <a:extLst>
+            <a:ext uri="{FF2B5EF4-FFF2-40B4-BE49-F238E27FC236}">
+              <a16:creationId xmlns:a16="http://schemas.microsoft.com/office/drawing/2014/main" id="{334C674A-ED7D-FBA8-0FCD-50CE384EC9DB}"/>
+            </a:ext>
+          </a:extLst>
+        </p:cNvPr>
         <p:cNvGrpSpPr/>
         <p:nvPr/>
       </p:nvGrpSpPr>
@@ -3346,12 +3362,59 @@
           <a:chExt cx="0" cy="0"/>
         </a:xfrm>
       </p:grpSpPr>
-      <p:sp>
-        <p:nvSpPr>
-          <p:cNvPr id="25" name="Elipse 24">
-            <a:extLst>
-              <a:ext uri="{FF2B5EF4-FFF2-40B4-BE49-F238E27FC236}">
-                <a16:creationId xmlns:a16="http://schemas.microsoft.com/office/drawing/2014/main" id="{EF6E0E80-4ABC-C764-B33A-AA3A01CF8F82}"/>
+      <p:pic>
+        <p:nvPicPr>
+          <p:cNvPr id="1026" name="Picture 2" descr="Maestría en Ciencia de Datos Unison">
+            <a:extLst>
+              <a:ext uri="{FF2B5EF4-FFF2-40B4-BE49-F238E27FC236}">
+                <a16:creationId xmlns:a16="http://schemas.microsoft.com/office/drawing/2014/main" id="{CB32C674-FB91-1C7F-C009-645AE77612B0}"/>
+              </a:ext>
+            </a:extLst>
+          </p:cNvPr>
+          <p:cNvPicPr>
+            <a:picLocks noChangeAspect="1" noChangeArrowheads="1"/>
+          </p:cNvPicPr>
+          <p:nvPr/>
+        </p:nvPicPr>
+        <p:blipFill>
+          <a:blip r:embed="rId2">
+            <a:extLst>
+              <a:ext uri="{28A0092B-C50C-407E-A947-70E740481C1C}">
+                <a14:useLocalDpi xmlns:a14="http://schemas.microsoft.com/office/drawing/2010/main" val="0"/>
+              </a:ext>
+            </a:extLst>
+          </a:blip>
+          <a:srcRect/>
+          <a:stretch>
+            <a:fillRect/>
+          </a:stretch>
+        </p:blipFill>
+        <p:spPr bwMode="auto">
+          <a:xfrm>
+            <a:off x="648929" y="4993657"/>
+            <a:ext cx="1070096" cy="1070096"/>
+          </a:xfrm>
+          <a:prstGeom prst="rect">
+            <a:avLst/>
+          </a:prstGeom>
+          <a:noFill/>
+          <a:extLst>
+            <a:ext uri="{909E8E84-426E-40DD-AFC4-6F175D3DCCD1}">
+              <a14:hiddenFill xmlns:a14="http://schemas.microsoft.com/office/drawing/2010/main">
+                <a:solidFill>
+                  <a:srgbClr val="FFFFFF"/>
+                </a:solidFill>
+              </a14:hiddenFill>
+            </a:ext>
+          </a:extLst>
+        </p:spPr>
+      </p:pic>
+      <p:sp>
+        <p:nvSpPr>
+          <p:cNvPr id="29" name="Elipse 28">
+            <a:extLst>
+              <a:ext uri="{FF2B5EF4-FFF2-40B4-BE49-F238E27FC236}">
+                <a16:creationId xmlns:a16="http://schemas.microsoft.com/office/drawing/2014/main" id="{A640F893-5EDC-5913-823A-1858DF8B4A4B}"/>
               </a:ext>
             </a:extLst>
           </p:cNvPr>
@@ -3360,64 +3423,8 @@
         </p:nvSpPr>
         <p:spPr>
           <a:xfrm>
-            <a:off x="9940741" y="50856"/>
-            <a:ext cx="2507492" cy="2554902"/>
-          </a:xfrm>
-          <a:prstGeom prst="ellipse">
-            <a:avLst/>
-          </a:prstGeom>
-          <a:solidFill>
-            <a:schemeClr val="accent4">
-              <a:lumMod val="60000"/>
-              <a:lumOff val="40000"/>
-              <a:alpha val="76863"/>
-            </a:schemeClr>
-          </a:solidFill>
-          <a:ln>
-            <a:noFill/>
-          </a:ln>
-        </p:spPr>
-        <p:style>
-          <a:lnRef idx="2">
-            <a:schemeClr val="accent1">
-              <a:shade val="15000"/>
-            </a:schemeClr>
-          </a:lnRef>
-          <a:fillRef idx="1">
-            <a:schemeClr val="accent1"/>
-          </a:fillRef>
-          <a:effectRef idx="0">
-            <a:schemeClr val="accent1"/>
-          </a:effectRef>
-          <a:fontRef idx="minor">
-            <a:schemeClr val="lt1"/>
-          </a:fontRef>
-        </p:style>
-        <p:txBody>
-          <a:bodyPr rtlCol="0" anchor="ctr"/>
-          <a:lstStyle/>
-          <a:p>
-            <a:pPr algn="ctr"/>
-            <a:endParaRPr lang="es-MX"/>
-          </a:p>
-        </p:txBody>
-      </p:sp>
-      <p:sp>
-        <p:nvSpPr>
-          <p:cNvPr id="27" name="Elipse 26">
-            <a:extLst>
-              <a:ext uri="{FF2B5EF4-FFF2-40B4-BE49-F238E27FC236}">
-                <a16:creationId xmlns:a16="http://schemas.microsoft.com/office/drawing/2014/main" id="{DC54676F-DB43-D879-25C7-01ADD07AEE8E}"/>
-              </a:ext>
-            </a:extLst>
-          </p:cNvPr>
-          <p:cNvSpPr/>
-          <p:nvPr/>
-        </p:nvSpPr>
-        <p:spPr>
-          <a:xfrm>
-            <a:off x="5684988" y="4292124"/>
-            <a:ext cx="2552499" cy="2556113"/>
+            <a:off x="7187381" y="1848465"/>
+            <a:ext cx="5686934" cy="5657303"/>
           </a:xfrm>
           <a:prstGeom prst="ellipse">
             <a:avLst/>
@@ -3458,10 +3465,10 @@
       </p:sp>
       <p:sp>
         <p:nvSpPr>
-          <p:cNvPr id="29" name="Elipse 28">
-            <a:extLst>
-              <a:ext uri="{FF2B5EF4-FFF2-40B4-BE49-F238E27FC236}">
-                <a16:creationId xmlns:a16="http://schemas.microsoft.com/office/drawing/2014/main" id="{E15FDA08-56EC-F45A-21A0-5C76AE5683B9}"/>
+          <p:cNvPr id="27" name="Elipse 26">
+            <a:extLst>
+              <a:ext uri="{FF2B5EF4-FFF2-40B4-BE49-F238E27FC236}">
+                <a16:creationId xmlns:a16="http://schemas.microsoft.com/office/drawing/2014/main" id="{EDBEECD2-1C0D-8EEE-980B-9E065DF96D56}"/>
               </a:ext>
             </a:extLst>
           </p:cNvPr>
@@ -3470,15 +3477,15 @@
         </p:nvSpPr>
         <p:spPr>
           <a:xfrm>
-            <a:off x="7187381" y="1848465"/>
-            <a:ext cx="5686934" cy="5657303"/>
+            <a:off x="5684988" y="4292124"/>
+            <a:ext cx="2552499" cy="2556113"/>
           </a:xfrm>
           <a:prstGeom prst="ellipse">
             <a:avLst/>
           </a:prstGeom>
           <a:solidFill>
             <a:srgbClr val="FF0000">
-              <a:alpha val="45882"/>
+              <a:alpha val="49020"/>
             </a:srgbClr>
           </a:solidFill>
           <a:ln>
@@ -3510,12 +3517,147 @@
           </a:p>
         </p:txBody>
       </p:sp>
+      <p:sp>
+        <p:nvSpPr>
+          <p:cNvPr id="25" name="Elipse 24">
+            <a:extLst>
+              <a:ext uri="{FF2B5EF4-FFF2-40B4-BE49-F238E27FC236}">
+                <a16:creationId xmlns:a16="http://schemas.microsoft.com/office/drawing/2014/main" id="{B5265E3E-2972-BE0D-23E1-63FB3438EB70}"/>
+              </a:ext>
+            </a:extLst>
+          </p:cNvPr>
+          <p:cNvSpPr/>
+          <p:nvPr/>
+        </p:nvSpPr>
+        <p:spPr>
+          <a:xfrm>
+            <a:off x="10324198" y="31192"/>
+            <a:ext cx="2507492" cy="2554902"/>
+          </a:xfrm>
+          <a:prstGeom prst="ellipse">
+            <a:avLst/>
+          </a:prstGeom>
+          <a:solidFill>
+            <a:srgbClr val="0070C0">
+              <a:alpha val="56863"/>
+            </a:srgbClr>
+          </a:solidFill>
+          <a:ln>
+            <a:noFill/>
+          </a:ln>
+        </p:spPr>
+        <p:style>
+          <a:lnRef idx="2">
+            <a:schemeClr val="accent1">
+              <a:shade val="15000"/>
+            </a:schemeClr>
+          </a:lnRef>
+          <a:fillRef idx="1">
+            <a:schemeClr val="accent1"/>
+          </a:fillRef>
+          <a:effectRef idx="0">
+            <a:schemeClr val="accent1"/>
+          </a:effectRef>
+          <a:fontRef idx="minor">
+            <a:schemeClr val="lt1"/>
+          </a:fontRef>
+        </p:style>
+        <p:txBody>
+          <a:bodyPr rtlCol="0" anchor="ctr"/>
+          <a:lstStyle/>
+          <a:p>
+            <a:pPr algn="ctr"/>
+            <a:endParaRPr lang="es-MX"/>
+          </a:p>
+        </p:txBody>
+      </p:sp>
+      <p:sp>
+        <p:nvSpPr>
+          <p:cNvPr id="2" name="Título 1">
+            <a:extLst>
+              <a:ext uri="{FF2B5EF4-FFF2-40B4-BE49-F238E27FC236}">
+                <a16:creationId xmlns:a16="http://schemas.microsoft.com/office/drawing/2014/main" id="{A22EB17F-1FD0-1453-396C-5E215095BA3B}"/>
+              </a:ext>
+            </a:extLst>
+          </p:cNvPr>
+          <p:cNvSpPr>
+            <a:spLocks noGrp="1"/>
+          </p:cNvSpPr>
+          <p:nvPr>
+            <p:ph type="ctrTitle"/>
+          </p:nvPr>
+        </p:nvSpPr>
+        <p:spPr>
+          <a:xfrm>
+            <a:off x="648929" y="1248697"/>
+            <a:ext cx="6784258" cy="2953109"/>
+          </a:xfrm>
+        </p:spPr>
+        <p:txBody>
+          <a:bodyPr>
+            <a:normAutofit/>
+          </a:bodyPr>
+          <a:lstStyle/>
+          <a:p>
+            <a:pPr algn="l"/>
+            <a:r>
+              <a:rPr lang="es-MX" sz="9600" b="1" dirty="0">
+                <a:latin typeface="Bebas Neue" panose="020B0606020202050201" pitchFamily="34" charset="0"/>
+              </a:rPr>
+              <a:t>Crimen en Hermosillo</a:t>
+            </a:r>
+          </a:p>
+        </p:txBody>
+      </p:sp>
+      <p:sp>
+        <p:nvSpPr>
+          <p:cNvPr id="3" name="Subtítulo 2">
+            <a:extLst>
+              <a:ext uri="{FF2B5EF4-FFF2-40B4-BE49-F238E27FC236}">
+                <a16:creationId xmlns:a16="http://schemas.microsoft.com/office/drawing/2014/main" id="{E5553ED5-2CB9-C046-09A9-01A5A7BDE52A}"/>
+              </a:ext>
+            </a:extLst>
+          </p:cNvPr>
+          <p:cNvSpPr>
+            <a:spLocks noGrp="1"/>
+          </p:cNvSpPr>
+          <p:nvPr>
+            <p:ph type="subTitle" idx="1"/>
+          </p:nvPr>
+        </p:nvSpPr>
+        <p:spPr>
+          <a:xfrm>
+            <a:off x="648929" y="4292123"/>
+            <a:ext cx="5889523" cy="869157"/>
+          </a:xfrm>
+        </p:spPr>
+        <p:txBody>
+          <a:bodyPr>
+            <a:normAutofit/>
+          </a:bodyPr>
+          <a:lstStyle/>
+          <a:p>
+            <a:pPr algn="l">
+              <a:lnSpc>
+                <a:spcPct val="120000"/>
+              </a:lnSpc>
+            </a:pPr>
+            <a:r>
+              <a:rPr lang="es-ES" sz="1600" dirty="0">
+                <a:latin typeface="Arial" panose="020B0604020202020204" pitchFamily="34" charset="0"/>
+                <a:cs typeface="Arial" panose="020B0604020202020204" pitchFamily="34" charset="0"/>
+              </a:rPr>
+              <a:t>Un análisis basado en el registro de llamadas de reporte al servicio de emergencias 911</a:t>
+            </a:r>
+          </a:p>
+        </p:txBody>
+      </p:sp>
       <p:pic>
         <p:nvPicPr>
-          <p:cNvPr id="17" name="Gráfico 16" descr="Investigación con relleno sólido">
-            <a:extLst>
-              <a:ext uri="{FF2B5EF4-FFF2-40B4-BE49-F238E27FC236}">
-                <a16:creationId xmlns:a16="http://schemas.microsoft.com/office/drawing/2014/main" id="{5130573E-C8F2-5BD5-459E-86B112276ADF}"/>
+          <p:cNvPr id="7" name="Gráfico 6" descr="Policía hombre con relleno sólido">
+            <a:extLst>
+              <a:ext uri="{FF2B5EF4-FFF2-40B4-BE49-F238E27FC236}">
+                <a16:creationId xmlns:a16="http://schemas.microsoft.com/office/drawing/2014/main" id="{25E2AA4F-41FE-E7EB-584C-D65456538369}"/>
               </a:ext>
             </a:extLst>
           </p:cNvPr>
@@ -3525,121 +3667,10 @@
           <p:nvPr/>
         </p:nvPicPr>
         <p:blipFill>
-          <a:blip r:embed="rId2">
+          <a:blip r:embed="rId3">
             <a:extLst>
               <a:ext uri="{96DAC541-7B7A-43D3-8B79-37D633B846F1}">
-                <asvg:svgBlip xmlns:asvg="http://schemas.microsoft.com/office/drawing/2016/SVG/main" r:embed="rId3"/>
-              </a:ext>
-            </a:extLst>
-          </a:blip>
-          <a:stretch>
-            <a:fillRect/>
-          </a:stretch>
-        </p:blipFill>
-        <p:spPr>
-          <a:xfrm>
-            <a:off x="9893471" y="179043"/>
-            <a:ext cx="2298529" cy="2298529"/>
-          </a:xfrm>
-          <a:prstGeom prst="rect">
-            <a:avLst/>
-          </a:prstGeom>
-        </p:spPr>
-      </p:pic>
-      <p:sp>
-        <p:nvSpPr>
-          <p:cNvPr id="2" name="Título 1">
-            <a:extLst>
-              <a:ext uri="{FF2B5EF4-FFF2-40B4-BE49-F238E27FC236}">
-                <a16:creationId xmlns:a16="http://schemas.microsoft.com/office/drawing/2014/main" id="{1F5DD341-AA91-A11C-0467-53D7B37BA358}"/>
-              </a:ext>
-            </a:extLst>
-          </p:cNvPr>
-          <p:cNvSpPr>
-            <a:spLocks noGrp="1"/>
-          </p:cNvSpPr>
-          <p:nvPr>
-            <p:ph type="ctrTitle"/>
-          </p:nvPr>
-        </p:nvSpPr>
-        <p:spPr>
-          <a:xfrm>
-            <a:off x="963561" y="648929"/>
-            <a:ext cx="6784258" cy="2953109"/>
-          </a:xfrm>
-        </p:spPr>
-        <p:txBody>
-          <a:bodyPr>
-            <a:normAutofit/>
-          </a:bodyPr>
-          <a:lstStyle/>
-          <a:p>
-            <a:pPr algn="l"/>
-            <a:r>
-              <a:rPr lang="es-MX" sz="9600" b="1" dirty="0">
-                <a:latin typeface="Century Gothic" panose="020B0502020202020204" pitchFamily="34" charset="0"/>
-              </a:rPr>
-              <a:t>Delito en Hermosillo</a:t>
-            </a:r>
-          </a:p>
-        </p:txBody>
-      </p:sp>
-      <p:sp>
-        <p:nvSpPr>
-          <p:cNvPr id="3" name="Subtítulo 2">
-            <a:extLst>
-              <a:ext uri="{FF2B5EF4-FFF2-40B4-BE49-F238E27FC236}">
-                <a16:creationId xmlns:a16="http://schemas.microsoft.com/office/drawing/2014/main" id="{36CFB073-B84A-D7A9-1E99-DD38C207543F}"/>
-              </a:ext>
-            </a:extLst>
-          </p:cNvPr>
-          <p:cNvSpPr>
-            <a:spLocks noGrp="1"/>
-          </p:cNvSpPr>
-          <p:nvPr>
-            <p:ph type="subTitle" idx="1"/>
-          </p:nvPr>
-        </p:nvSpPr>
-        <p:spPr>
-          <a:xfrm>
-            <a:off x="963561" y="3602038"/>
-            <a:ext cx="5889523" cy="1655762"/>
-          </a:xfrm>
-        </p:spPr>
-        <p:txBody>
-          <a:bodyPr/>
-          <a:lstStyle/>
-          <a:p>
-            <a:pPr algn="l"/>
-            <a:r>
-              <a:rPr lang="es-ES" dirty="0">
-                <a:latin typeface="Arial" panose="020B0604020202020204" pitchFamily="34" charset="0"/>
-                <a:cs typeface="Arial" panose="020B0604020202020204" pitchFamily="34" charset="0"/>
-              </a:rPr>
-              <a:t>Hallazgos clave del análisis exploratorio de datos (EDA)</a:t>
-            </a:r>
-          </a:p>
-        </p:txBody>
-      </p:sp>
-      <p:pic>
-        <p:nvPicPr>
-          <p:cNvPr id="7" name="Gráfico 6" descr="Policía hombre con relleno sólido">
-            <a:extLst>
-              <a:ext uri="{FF2B5EF4-FFF2-40B4-BE49-F238E27FC236}">
-                <a16:creationId xmlns:a16="http://schemas.microsoft.com/office/drawing/2014/main" id="{E79CD503-8AE2-0255-B40E-6B316B74F47F}"/>
-              </a:ext>
-            </a:extLst>
-          </p:cNvPr>
-          <p:cNvPicPr>
-            <a:picLocks noChangeAspect="1"/>
-          </p:cNvPicPr>
-          <p:nvPr/>
-        </p:nvPicPr>
-        <p:blipFill>
-          <a:blip r:embed="rId4">
-            <a:extLst>
-              <a:ext uri="{96DAC541-7B7A-43D3-8B79-37D633B846F1}">
-                <asvg:svgBlip xmlns:asvg="http://schemas.microsoft.com/office/drawing/2016/SVG/main" r:embed="rId5"/>
+                <asvg:svgBlip xmlns:asvg="http://schemas.microsoft.com/office/drawing/2016/SVG/main" r:embed="rId4"/>
               </a:ext>
             </a:extLst>
           </a:blip>
@@ -3659,10 +3690,10 @@
       </p:pic>
       <p:pic>
         <p:nvPicPr>
-          <p:cNvPr id="11" name="Gráfico 10" descr="Dirigir dos pines por un camino con relleno sólido">
-            <a:extLst>
-              <a:ext uri="{FF2B5EF4-FFF2-40B4-BE49-F238E27FC236}">
-                <a16:creationId xmlns:a16="http://schemas.microsoft.com/office/drawing/2014/main" id="{A0AA0A34-BE77-E372-72FC-F4F99AB3A13D}"/>
+          <p:cNvPr id="5" name="Gráfico 4" descr="Ladrón con relleno sólido">
+            <a:extLst>
+              <a:ext uri="{FF2B5EF4-FFF2-40B4-BE49-F238E27FC236}">
+                <a16:creationId xmlns:a16="http://schemas.microsoft.com/office/drawing/2014/main" id="{5F85E180-67F6-69DD-B44E-8CB4AFEFD16A}"/>
               </a:ext>
             </a:extLst>
           </p:cNvPr>
@@ -3672,10 +3703,85 @@
           <p:nvPr/>
         </p:nvPicPr>
         <p:blipFill>
-          <a:blip r:embed="rId6">
+          <a:blip r:embed="rId5">
             <a:extLst>
               <a:ext uri="{96DAC541-7B7A-43D3-8B79-37D633B846F1}">
-                <asvg:svgBlip xmlns:asvg="http://schemas.microsoft.com/office/drawing/2016/SVG/main" r:embed="rId7"/>
+                <asvg:svgBlip xmlns:asvg="http://schemas.microsoft.com/office/drawing/2016/SVG/main" r:embed="rId6"/>
+              </a:ext>
+            </a:extLst>
+          </a:blip>
+          <a:stretch>
+            <a:fillRect/>
+          </a:stretch>
+        </p:blipFill>
+        <p:spPr>
+          <a:xfrm flipH="1">
+            <a:off x="5921503" y="4588484"/>
+            <a:ext cx="2084441" cy="2084441"/>
+          </a:xfrm>
+          <a:prstGeom prst="rect">
+            <a:avLst/>
+          </a:prstGeom>
+        </p:spPr>
+      </p:pic>
+      <p:cxnSp>
+        <p:nvCxnSpPr>
+          <p:cNvPr id="8" name="Conector recto 7">
+            <a:extLst>
+              <a:ext uri="{FF2B5EF4-FFF2-40B4-BE49-F238E27FC236}">
+                <a16:creationId xmlns:a16="http://schemas.microsoft.com/office/drawing/2014/main" id="{51762156-DC87-A169-E7A2-9BEA88DB47AC}"/>
+              </a:ext>
+            </a:extLst>
+          </p:cNvPr>
+          <p:cNvCxnSpPr>
+            <a:cxnSpLocks/>
+          </p:cNvCxnSpPr>
+          <p:nvPr/>
+        </p:nvCxnSpPr>
+        <p:spPr>
+          <a:xfrm>
+            <a:off x="757084" y="4201806"/>
+            <a:ext cx="6007510" cy="0"/>
+          </a:xfrm>
+          <a:prstGeom prst="line">
+            <a:avLst/>
+          </a:prstGeom>
+          <a:ln/>
+        </p:spPr>
+        <p:style>
+          <a:lnRef idx="2">
+            <a:schemeClr val="dk1"/>
+          </a:lnRef>
+          <a:fillRef idx="0">
+            <a:schemeClr val="dk1"/>
+          </a:fillRef>
+          <a:effectRef idx="1">
+            <a:schemeClr val="dk1"/>
+          </a:effectRef>
+          <a:fontRef idx="minor">
+            <a:schemeClr val="tx1"/>
+          </a:fontRef>
+        </p:style>
+      </p:cxnSp>
+      <p:pic>
+        <p:nvPicPr>
+          <p:cNvPr id="9" name="Gráfico 8" descr="Altavoz de teléfono con relleno sólido">
+            <a:extLst>
+              <a:ext uri="{FF2B5EF4-FFF2-40B4-BE49-F238E27FC236}">
+                <a16:creationId xmlns:a16="http://schemas.microsoft.com/office/drawing/2014/main" id="{72F1FF3B-96A6-3127-D791-B94859B7B946}"/>
+              </a:ext>
+            </a:extLst>
+          </p:cNvPr>
+          <p:cNvPicPr>
+            <a:picLocks noChangeAspect="1"/>
+          </p:cNvPicPr>
+          <p:nvPr/>
+        </p:nvPicPr>
+        <p:blipFill>
+          <a:blip r:embed="rId7">
+            <a:extLst>
+              <a:ext uri="{96DAC541-7B7A-43D3-8B79-37D633B846F1}">
+                <asvg:svgBlip xmlns:asvg="http://schemas.microsoft.com/office/drawing/2016/SVG/main" r:embed="rId8"/>
               </a:ext>
             </a:extLst>
           </a:blip>
@@ -3685,18 +3791,230 @@
         </p:blipFill>
         <p:spPr>
           <a:xfrm>
-            <a:off x="5608275" y="4360949"/>
-            <a:ext cx="2371630" cy="2371630"/>
+            <a:off x="10238607" y="41352"/>
+            <a:ext cx="2507492" cy="2507492"/>
           </a:xfrm>
           <a:prstGeom prst="rect">
             <a:avLst/>
           </a:prstGeom>
         </p:spPr>
       </p:pic>
+      <p:sp>
+        <p:nvSpPr>
+          <p:cNvPr id="10" name="Subtítulo 2">
+            <a:extLst>
+              <a:ext uri="{FF2B5EF4-FFF2-40B4-BE49-F238E27FC236}">
+                <a16:creationId xmlns:a16="http://schemas.microsoft.com/office/drawing/2014/main" id="{02C26D4A-50FD-53B9-F9A0-C7327212CD85}"/>
+              </a:ext>
+            </a:extLst>
+          </p:cNvPr>
+          <p:cNvSpPr txBox="1">
+            <a:spLocks/>
+          </p:cNvSpPr>
+          <p:nvPr/>
+        </p:nvSpPr>
+        <p:spPr>
+          <a:xfrm>
+            <a:off x="664919" y="6228080"/>
+            <a:ext cx="5889523" cy="455830"/>
+          </a:xfrm>
+          <a:prstGeom prst="rect">
+            <a:avLst/>
+          </a:prstGeom>
+        </p:spPr>
+        <p:txBody>
+          <a:bodyPr vert="horz" lIns="91440" tIns="45720" rIns="91440" bIns="45720" rtlCol="0">
+            <a:normAutofit/>
+          </a:bodyPr>
+          <a:lstStyle>
+            <a:lvl1pPr marL="0" indent="0" algn="ctr" defTabSz="914400" rtl="0" eaLnBrk="1" latinLnBrk="0" hangingPunct="1">
+              <a:lnSpc>
+                <a:spcPct val="90000"/>
+              </a:lnSpc>
+              <a:spcBef>
+                <a:spcPts val="1000"/>
+              </a:spcBef>
+              <a:buFont typeface="Arial" panose="020B0604020202020204" pitchFamily="34" charset="0"/>
+              <a:buNone/>
+              <a:defRPr sz="2400" kern="1200">
+                <a:solidFill>
+                  <a:schemeClr val="tx1"/>
+                </a:solidFill>
+                <a:latin typeface="+mn-lt"/>
+                <a:ea typeface="+mn-ea"/>
+                <a:cs typeface="+mn-cs"/>
+              </a:defRPr>
+            </a:lvl1pPr>
+            <a:lvl2pPr marL="457200" indent="0" algn="ctr" defTabSz="914400" rtl="0" eaLnBrk="1" latinLnBrk="0" hangingPunct="1">
+              <a:lnSpc>
+                <a:spcPct val="90000"/>
+              </a:lnSpc>
+              <a:spcBef>
+                <a:spcPts val="500"/>
+              </a:spcBef>
+              <a:buFont typeface="Arial" panose="020B0604020202020204" pitchFamily="34" charset="0"/>
+              <a:buNone/>
+              <a:defRPr sz="2000" kern="1200">
+                <a:solidFill>
+                  <a:schemeClr val="tx1"/>
+                </a:solidFill>
+                <a:latin typeface="+mn-lt"/>
+                <a:ea typeface="+mn-ea"/>
+                <a:cs typeface="+mn-cs"/>
+              </a:defRPr>
+            </a:lvl2pPr>
+            <a:lvl3pPr marL="914400" indent="0" algn="ctr" defTabSz="914400" rtl="0" eaLnBrk="1" latinLnBrk="0" hangingPunct="1">
+              <a:lnSpc>
+                <a:spcPct val="90000"/>
+              </a:lnSpc>
+              <a:spcBef>
+                <a:spcPts val="500"/>
+              </a:spcBef>
+              <a:buFont typeface="Arial" panose="020B0604020202020204" pitchFamily="34" charset="0"/>
+              <a:buNone/>
+              <a:defRPr sz="1800" kern="1200">
+                <a:solidFill>
+                  <a:schemeClr val="tx1"/>
+                </a:solidFill>
+                <a:latin typeface="+mn-lt"/>
+                <a:ea typeface="+mn-ea"/>
+                <a:cs typeface="+mn-cs"/>
+              </a:defRPr>
+            </a:lvl3pPr>
+            <a:lvl4pPr marL="1371600" indent="0" algn="ctr" defTabSz="914400" rtl="0" eaLnBrk="1" latinLnBrk="0" hangingPunct="1">
+              <a:lnSpc>
+                <a:spcPct val="90000"/>
+              </a:lnSpc>
+              <a:spcBef>
+                <a:spcPts val="500"/>
+              </a:spcBef>
+              <a:buFont typeface="Arial" panose="020B0604020202020204" pitchFamily="34" charset="0"/>
+              <a:buNone/>
+              <a:defRPr sz="1600" kern="1200">
+                <a:solidFill>
+                  <a:schemeClr val="tx1"/>
+                </a:solidFill>
+                <a:latin typeface="+mn-lt"/>
+                <a:ea typeface="+mn-ea"/>
+                <a:cs typeface="+mn-cs"/>
+              </a:defRPr>
+            </a:lvl4pPr>
+            <a:lvl5pPr marL="1828800" indent="0" algn="ctr" defTabSz="914400" rtl="0" eaLnBrk="1" latinLnBrk="0" hangingPunct="1">
+              <a:lnSpc>
+                <a:spcPct val="90000"/>
+              </a:lnSpc>
+              <a:spcBef>
+                <a:spcPts val="500"/>
+              </a:spcBef>
+              <a:buFont typeface="Arial" panose="020B0604020202020204" pitchFamily="34" charset="0"/>
+              <a:buNone/>
+              <a:defRPr sz="1600" kern="1200">
+                <a:solidFill>
+                  <a:schemeClr val="tx1"/>
+                </a:solidFill>
+                <a:latin typeface="+mn-lt"/>
+                <a:ea typeface="+mn-ea"/>
+                <a:cs typeface="+mn-cs"/>
+              </a:defRPr>
+            </a:lvl5pPr>
+            <a:lvl6pPr marL="2286000" indent="0" algn="ctr" defTabSz="914400" rtl="0" eaLnBrk="1" latinLnBrk="0" hangingPunct="1">
+              <a:lnSpc>
+                <a:spcPct val="90000"/>
+              </a:lnSpc>
+              <a:spcBef>
+                <a:spcPts val="500"/>
+              </a:spcBef>
+              <a:buFont typeface="Arial" panose="020B0604020202020204" pitchFamily="34" charset="0"/>
+              <a:buNone/>
+              <a:defRPr sz="1600" kern="1200">
+                <a:solidFill>
+                  <a:schemeClr val="tx1"/>
+                </a:solidFill>
+                <a:latin typeface="+mn-lt"/>
+                <a:ea typeface="+mn-ea"/>
+                <a:cs typeface="+mn-cs"/>
+              </a:defRPr>
+            </a:lvl6pPr>
+            <a:lvl7pPr marL="2743200" indent="0" algn="ctr" defTabSz="914400" rtl="0" eaLnBrk="1" latinLnBrk="0" hangingPunct="1">
+              <a:lnSpc>
+                <a:spcPct val="90000"/>
+              </a:lnSpc>
+              <a:spcBef>
+                <a:spcPts val="500"/>
+              </a:spcBef>
+              <a:buFont typeface="Arial" panose="020B0604020202020204" pitchFamily="34" charset="0"/>
+              <a:buNone/>
+              <a:defRPr sz="1600" kern="1200">
+                <a:solidFill>
+                  <a:schemeClr val="tx1"/>
+                </a:solidFill>
+                <a:latin typeface="+mn-lt"/>
+                <a:ea typeface="+mn-ea"/>
+                <a:cs typeface="+mn-cs"/>
+              </a:defRPr>
+            </a:lvl7pPr>
+            <a:lvl8pPr marL="3200400" indent="0" algn="ctr" defTabSz="914400" rtl="0" eaLnBrk="1" latinLnBrk="0" hangingPunct="1">
+              <a:lnSpc>
+                <a:spcPct val="90000"/>
+              </a:lnSpc>
+              <a:spcBef>
+                <a:spcPts val="500"/>
+              </a:spcBef>
+              <a:buFont typeface="Arial" panose="020B0604020202020204" pitchFamily="34" charset="0"/>
+              <a:buNone/>
+              <a:defRPr sz="1600" kern="1200">
+                <a:solidFill>
+                  <a:schemeClr val="tx1"/>
+                </a:solidFill>
+                <a:latin typeface="+mn-lt"/>
+                <a:ea typeface="+mn-ea"/>
+                <a:cs typeface="+mn-cs"/>
+              </a:defRPr>
+            </a:lvl8pPr>
+            <a:lvl9pPr marL="3657600" indent="0" algn="ctr" defTabSz="914400" rtl="0" eaLnBrk="1" latinLnBrk="0" hangingPunct="1">
+              <a:lnSpc>
+                <a:spcPct val="90000"/>
+              </a:lnSpc>
+              <a:spcBef>
+                <a:spcPts val="500"/>
+              </a:spcBef>
+              <a:buFont typeface="Arial" panose="020B0604020202020204" pitchFamily="34" charset="0"/>
+              <a:buNone/>
+              <a:defRPr sz="1600" kern="1200">
+                <a:solidFill>
+                  <a:schemeClr val="tx1"/>
+                </a:solidFill>
+                <a:latin typeface="+mn-lt"/>
+                <a:ea typeface="+mn-ea"/>
+                <a:cs typeface="+mn-cs"/>
+              </a:defRPr>
+            </a:lvl9pPr>
+          </a:lstStyle>
+          <a:p>
+            <a:pPr algn="l">
+              <a:lnSpc>
+                <a:spcPct val="120000"/>
+              </a:lnSpc>
+            </a:pPr>
+            <a:r>
+              <a:rPr lang="es-ES" sz="1400" dirty="0">
+                <a:solidFill>
+                  <a:schemeClr val="bg2">
+                    <a:lumMod val="75000"/>
+                  </a:schemeClr>
+                </a:solidFill>
+                <a:latin typeface="Arial" panose="020B0604020202020204" pitchFamily="34" charset="0"/>
+                <a:cs typeface="Arial" panose="020B0604020202020204" pitchFamily="34" charset="0"/>
+              </a:rPr>
+              <a:t>Joel Pérez / Esthefania Ortega / José Cazares / Marcel Herrera</a:t>
+            </a:r>
+          </a:p>
+        </p:txBody>
+      </p:sp>
     </p:spTree>
     <p:extLst>
       <p:ext uri="{BB962C8B-B14F-4D97-AF65-F5344CB8AC3E}">
-        <p14:creationId xmlns:p14="http://schemas.microsoft.com/office/powerpoint/2010/main" val="303947384"/>
+        <p14:creationId xmlns:p14="http://schemas.microsoft.com/office/powerpoint/2010/main" val="695456665"/>
       </p:ext>
     </p:extLst>
   </p:cSld>
@@ -3723,6 +4041,565 @@
           <a:chExt cx="0" cy="0"/>
         </a:xfrm>
       </p:grpSpPr>
+      <p:grpSp>
+        <p:nvGrpSpPr>
+          <p:cNvPr id="32" name="Grupo 31">
+            <a:extLst>
+              <a:ext uri="{FF2B5EF4-FFF2-40B4-BE49-F238E27FC236}">
+                <a16:creationId xmlns:a16="http://schemas.microsoft.com/office/drawing/2014/main" id="{8D470145-DA20-6603-DDFB-689D7E0B59FA}"/>
+              </a:ext>
+            </a:extLst>
+          </p:cNvPr>
+          <p:cNvGrpSpPr/>
+          <p:nvPr/>
+        </p:nvGrpSpPr>
+        <p:grpSpPr>
+          <a:xfrm>
+            <a:off x="6574057" y="2573963"/>
+            <a:ext cx="5083516" cy="902787"/>
+            <a:chOff x="6651284" y="1572867"/>
+            <a:chExt cx="5083516" cy="902787"/>
+          </a:xfrm>
+          <a:solidFill>
+            <a:srgbClr val="CC9900"/>
+          </a:solidFill>
+        </p:grpSpPr>
+        <p:sp>
+          <p:nvSpPr>
+            <p:cNvPr id="33" name="Elipse 32">
+              <a:extLst>
+                <a:ext uri="{FF2B5EF4-FFF2-40B4-BE49-F238E27FC236}">
+                  <a16:creationId xmlns:a16="http://schemas.microsoft.com/office/drawing/2014/main" id="{2B547689-C12E-87A8-EF7C-FCB9131D7F34}"/>
+                </a:ext>
+              </a:extLst>
+            </p:cNvPr>
+            <p:cNvSpPr/>
+            <p:nvPr/>
+          </p:nvSpPr>
+          <p:spPr>
+            <a:xfrm>
+              <a:off x="10834800" y="1575654"/>
+              <a:ext cx="900000" cy="900000"/>
+            </a:xfrm>
+            <a:prstGeom prst="ellipse">
+              <a:avLst/>
+            </a:prstGeom>
+            <a:grpFill/>
+            <a:ln>
+              <a:noFill/>
+            </a:ln>
+          </p:spPr>
+          <p:style>
+            <a:lnRef idx="2">
+              <a:schemeClr val="accent1">
+                <a:shade val="15000"/>
+              </a:schemeClr>
+            </a:lnRef>
+            <a:fillRef idx="1">
+              <a:schemeClr val="accent1"/>
+            </a:fillRef>
+            <a:effectRef idx="0">
+              <a:schemeClr val="accent1"/>
+            </a:effectRef>
+            <a:fontRef idx="minor">
+              <a:schemeClr val="lt1"/>
+            </a:fontRef>
+          </p:style>
+          <p:txBody>
+            <a:bodyPr rtlCol="0" anchor="ctr"/>
+            <a:lstStyle/>
+            <a:p>
+              <a:pPr algn="ctr"/>
+              <a:endParaRPr lang="es-MX"/>
+            </a:p>
+          </p:txBody>
+        </p:sp>
+        <p:sp>
+          <p:nvSpPr>
+            <p:cNvPr id="34" name="Elipse 33">
+              <a:extLst>
+                <a:ext uri="{FF2B5EF4-FFF2-40B4-BE49-F238E27FC236}">
+                  <a16:creationId xmlns:a16="http://schemas.microsoft.com/office/drawing/2014/main" id="{90505A00-5FEE-31D4-42EB-7CA4874303DC}"/>
+                </a:ext>
+              </a:extLst>
+            </p:cNvPr>
+            <p:cNvSpPr/>
+            <p:nvPr/>
+          </p:nvSpPr>
+          <p:spPr>
+            <a:xfrm>
+              <a:off x="6651284" y="1574627"/>
+              <a:ext cx="900000" cy="900000"/>
+            </a:xfrm>
+            <a:prstGeom prst="ellipse">
+              <a:avLst/>
+            </a:prstGeom>
+            <a:grpFill/>
+            <a:ln>
+              <a:noFill/>
+            </a:ln>
+          </p:spPr>
+          <p:style>
+            <a:lnRef idx="2">
+              <a:schemeClr val="accent1">
+                <a:shade val="15000"/>
+              </a:schemeClr>
+            </a:lnRef>
+            <a:fillRef idx="1">
+              <a:schemeClr val="accent1"/>
+            </a:fillRef>
+            <a:effectRef idx="0">
+              <a:schemeClr val="accent1"/>
+            </a:effectRef>
+            <a:fontRef idx="minor">
+              <a:schemeClr val="lt1"/>
+            </a:fontRef>
+          </p:style>
+          <p:txBody>
+            <a:bodyPr rtlCol="0" anchor="ctr"/>
+            <a:lstStyle/>
+            <a:p>
+              <a:pPr algn="ctr"/>
+              <a:endParaRPr lang="es-MX"/>
+            </a:p>
+          </p:txBody>
+        </p:sp>
+        <p:sp>
+          <p:nvSpPr>
+            <p:cNvPr id="35" name="Rectángulo 34">
+              <a:extLst>
+                <a:ext uri="{FF2B5EF4-FFF2-40B4-BE49-F238E27FC236}">
+                  <a16:creationId xmlns:a16="http://schemas.microsoft.com/office/drawing/2014/main" id="{F2FA593D-62A1-918D-1D03-E7A3B333634A}"/>
+                </a:ext>
+              </a:extLst>
+            </p:cNvPr>
+            <p:cNvSpPr/>
+            <p:nvPr/>
+          </p:nvSpPr>
+          <p:spPr>
+            <a:xfrm>
+              <a:off x="7091680" y="1572867"/>
+              <a:ext cx="4185920" cy="900000"/>
+            </a:xfrm>
+            <a:prstGeom prst="rect">
+              <a:avLst/>
+            </a:prstGeom>
+            <a:grpFill/>
+            <a:ln>
+              <a:noFill/>
+            </a:ln>
+          </p:spPr>
+          <p:style>
+            <a:lnRef idx="2">
+              <a:schemeClr val="accent1">
+                <a:shade val="15000"/>
+              </a:schemeClr>
+            </a:lnRef>
+            <a:fillRef idx="1">
+              <a:schemeClr val="accent1"/>
+            </a:fillRef>
+            <a:effectRef idx="0">
+              <a:schemeClr val="accent1"/>
+            </a:effectRef>
+            <a:fontRef idx="minor">
+              <a:schemeClr val="lt1"/>
+            </a:fontRef>
+          </p:style>
+          <p:txBody>
+            <a:bodyPr rtlCol="0" anchor="ctr"/>
+            <a:lstStyle/>
+            <a:p>
+              <a:pPr algn="ctr"/>
+              <a:endParaRPr lang="es-MX"/>
+            </a:p>
+          </p:txBody>
+        </p:sp>
+      </p:grpSp>
+      <p:grpSp>
+        <p:nvGrpSpPr>
+          <p:cNvPr id="36" name="Grupo 35">
+            <a:extLst>
+              <a:ext uri="{FF2B5EF4-FFF2-40B4-BE49-F238E27FC236}">
+                <a16:creationId xmlns:a16="http://schemas.microsoft.com/office/drawing/2014/main" id="{CB1C3604-1195-9CD0-FC3D-FCBC01FAD4B8}"/>
+              </a:ext>
+            </a:extLst>
+          </p:cNvPr>
+          <p:cNvGrpSpPr/>
+          <p:nvPr/>
+        </p:nvGrpSpPr>
+        <p:grpSpPr>
+          <a:xfrm>
+            <a:off x="6582459" y="3590410"/>
+            <a:ext cx="5083516" cy="902787"/>
+            <a:chOff x="6651284" y="1572867"/>
+            <a:chExt cx="5083516" cy="902787"/>
+          </a:xfrm>
+          <a:solidFill>
+            <a:srgbClr val="FF9900"/>
+          </a:solidFill>
+        </p:grpSpPr>
+        <p:sp>
+          <p:nvSpPr>
+            <p:cNvPr id="37" name="Elipse 36">
+              <a:extLst>
+                <a:ext uri="{FF2B5EF4-FFF2-40B4-BE49-F238E27FC236}">
+                  <a16:creationId xmlns:a16="http://schemas.microsoft.com/office/drawing/2014/main" id="{2A5389B8-E3FB-4A09-8BF6-F423BCF268E2}"/>
+                </a:ext>
+              </a:extLst>
+            </p:cNvPr>
+            <p:cNvSpPr/>
+            <p:nvPr/>
+          </p:nvSpPr>
+          <p:spPr>
+            <a:xfrm>
+              <a:off x="10834800" y="1575654"/>
+              <a:ext cx="900000" cy="900000"/>
+            </a:xfrm>
+            <a:prstGeom prst="ellipse">
+              <a:avLst/>
+            </a:prstGeom>
+            <a:grpFill/>
+            <a:ln>
+              <a:noFill/>
+            </a:ln>
+          </p:spPr>
+          <p:style>
+            <a:lnRef idx="2">
+              <a:schemeClr val="accent1">
+                <a:shade val="15000"/>
+              </a:schemeClr>
+            </a:lnRef>
+            <a:fillRef idx="1">
+              <a:schemeClr val="accent1"/>
+            </a:fillRef>
+            <a:effectRef idx="0">
+              <a:schemeClr val="accent1"/>
+            </a:effectRef>
+            <a:fontRef idx="minor">
+              <a:schemeClr val="lt1"/>
+            </a:fontRef>
+          </p:style>
+          <p:txBody>
+            <a:bodyPr rtlCol="0" anchor="ctr"/>
+            <a:lstStyle/>
+            <a:p>
+              <a:pPr algn="ctr"/>
+              <a:endParaRPr lang="es-MX"/>
+            </a:p>
+          </p:txBody>
+        </p:sp>
+        <p:sp>
+          <p:nvSpPr>
+            <p:cNvPr id="38" name="Elipse 37">
+              <a:extLst>
+                <a:ext uri="{FF2B5EF4-FFF2-40B4-BE49-F238E27FC236}">
+                  <a16:creationId xmlns:a16="http://schemas.microsoft.com/office/drawing/2014/main" id="{8C4C37FB-5441-C262-9F6E-ED43A493E4C4}"/>
+                </a:ext>
+              </a:extLst>
+            </p:cNvPr>
+            <p:cNvSpPr/>
+            <p:nvPr/>
+          </p:nvSpPr>
+          <p:spPr>
+            <a:xfrm>
+              <a:off x="6651284" y="1574627"/>
+              <a:ext cx="900000" cy="900000"/>
+            </a:xfrm>
+            <a:prstGeom prst="ellipse">
+              <a:avLst/>
+            </a:prstGeom>
+            <a:grpFill/>
+            <a:ln>
+              <a:noFill/>
+            </a:ln>
+          </p:spPr>
+          <p:style>
+            <a:lnRef idx="2">
+              <a:schemeClr val="accent1">
+                <a:shade val="15000"/>
+              </a:schemeClr>
+            </a:lnRef>
+            <a:fillRef idx="1">
+              <a:schemeClr val="accent1"/>
+            </a:fillRef>
+            <a:effectRef idx="0">
+              <a:schemeClr val="accent1"/>
+            </a:effectRef>
+            <a:fontRef idx="minor">
+              <a:schemeClr val="lt1"/>
+            </a:fontRef>
+          </p:style>
+          <p:txBody>
+            <a:bodyPr rtlCol="0" anchor="ctr"/>
+            <a:lstStyle/>
+            <a:p>
+              <a:pPr algn="ctr"/>
+              <a:endParaRPr lang="es-MX"/>
+            </a:p>
+          </p:txBody>
+        </p:sp>
+        <p:sp>
+          <p:nvSpPr>
+            <p:cNvPr id="39" name="Rectángulo 38">
+              <a:extLst>
+                <a:ext uri="{FF2B5EF4-FFF2-40B4-BE49-F238E27FC236}">
+                  <a16:creationId xmlns:a16="http://schemas.microsoft.com/office/drawing/2014/main" id="{8B900E70-83E9-6308-CFE8-67DDE59B37E8}"/>
+                </a:ext>
+              </a:extLst>
+            </p:cNvPr>
+            <p:cNvSpPr/>
+            <p:nvPr/>
+          </p:nvSpPr>
+          <p:spPr>
+            <a:xfrm>
+              <a:off x="7091680" y="1572867"/>
+              <a:ext cx="4185920" cy="900000"/>
+            </a:xfrm>
+            <a:prstGeom prst="rect">
+              <a:avLst/>
+            </a:prstGeom>
+            <a:grpFill/>
+            <a:ln>
+              <a:noFill/>
+            </a:ln>
+          </p:spPr>
+          <p:style>
+            <a:lnRef idx="2">
+              <a:schemeClr val="accent1">
+                <a:shade val="15000"/>
+              </a:schemeClr>
+            </a:lnRef>
+            <a:fillRef idx="1">
+              <a:schemeClr val="accent1"/>
+            </a:fillRef>
+            <a:effectRef idx="0">
+              <a:schemeClr val="accent1"/>
+            </a:effectRef>
+            <a:fontRef idx="minor">
+              <a:schemeClr val="lt1"/>
+            </a:fontRef>
+          </p:style>
+          <p:txBody>
+            <a:bodyPr rtlCol="0" anchor="ctr"/>
+            <a:lstStyle/>
+            <a:p>
+              <a:pPr algn="ctr"/>
+              <a:endParaRPr lang="es-MX"/>
+            </a:p>
+          </p:txBody>
+        </p:sp>
+      </p:grpSp>
+      <p:grpSp>
+        <p:nvGrpSpPr>
+          <p:cNvPr id="31" name="Grupo 30">
+            <a:extLst>
+              <a:ext uri="{FF2B5EF4-FFF2-40B4-BE49-F238E27FC236}">
+                <a16:creationId xmlns:a16="http://schemas.microsoft.com/office/drawing/2014/main" id="{E436D7BC-DFA0-FB06-546B-FAA3CC1ED315}"/>
+              </a:ext>
+            </a:extLst>
+          </p:cNvPr>
+          <p:cNvGrpSpPr/>
+          <p:nvPr/>
+        </p:nvGrpSpPr>
+        <p:grpSpPr>
+          <a:xfrm>
+            <a:off x="6582459" y="1593431"/>
+            <a:ext cx="5083516" cy="902787"/>
+            <a:chOff x="6651284" y="1572867"/>
+            <a:chExt cx="5083516" cy="902787"/>
+          </a:xfrm>
+          <a:solidFill>
+            <a:schemeClr val="accent2">
+              <a:lumMod val="75000"/>
+            </a:schemeClr>
+          </a:solidFill>
+        </p:grpSpPr>
+        <p:sp>
+          <p:nvSpPr>
+            <p:cNvPr id="30" name="Elipse 29">
+              <a:extLst>
+                <a:ext uri="{FF2B5EF4-FFF2-40B4-BE49-F238E27FC236}">
+                  <a16:creationId xmlns:a16="http://schemas.microsoft.com/office/drawing/2014/main" id="{E3A0D11E-2EC9-AE71-2DEF-FDDA9D1E3BF1}"/>
+                </a:ext>
+              </a:extLst>
+            </p:cNvPr>
+            <p:cNvSpPr/>
+            <p:nvPr/>
+          </p:nvSpPr>
+          <p:spPr>
+            <a:xfrm>
+              <a:off x="10834800" y="1575654"/>
+              <a:ext cx="900000" cy="900000"/>
+            </a:xfrm>
+            <a:prstGeom prst="ellipse">
+              <a:avLst/>
+            </a:prstGeom>
+            <a:grpFill/>
+            <a:ln>
+              <a:noFill/>
+            </a:ln>
+          </p:spPr>
+          <p:style>
+            <a:lnRef idx="2">
+              <a:schemeClr val="accent1">
+                <a:shade val="15000"/>
+              </a:schemeClr>
+            </a:lnRef>
+            <a:fillRef idx="1">
+              <a:schemeClr val="accent1"/>
+            </a:fillRef>
+            <a:effectRef idx="0">
+              <a:schemeClr val="accent1"/>
+            </a:effectRef>
+            <a:fontRef idx="minor">
+              <a:schemeClr val="lt1"/>
+            </a:fontRef>
+          </p:style>
+          <p:txBody>
+            <a:bodyPr rtlCol="0" anchor="ctr"/>
+            <a:lstStyle/>
+            <a:p>
+              <a:pPr algn="ctr"/>
+              <a:endParaRPr lang="es-MX"/>
+            </a:p>
+          </p:txBody>
+        </p:sp>
+        <p:sp>
+          <p:nvSpPr>
+            <p:cNvPr id="29" name="Elipse 28">
+              <a:extLst>
+                <a:ext uri="{FF2B5EF4-FFF2-40B4-BE49-F238E27FC236}">
+                  <a16:creationId xmlns:a16="http://schemas.microsoft.com/office/drawing/2014/main" id="{E5BAA6AB-35EF-3F83-616A-95857ED12C2C}"/>
+                </a:ext>
+              </a:extLst>
+            </p:cNvPr>
+            <p:cNvSpPr/>
+            <p:nvPr/>
+          </p:nvSpPr>
+          <p:spPr>
+            <a:xfrm>
+              <a:off x="6651284" y="1574627"/>
+              <a:ext cx="900000" cy="900000"/>
+            </a:xfrm>
+            <a:prstGeom prst="ellipse">
+              <a:avLst/>
+            </a:prstGeom>
+            <a:grpFill/>
+            <a:ln>
+              <a:noFill/>
+            </a:ln>
+          </p:spPr>
+          <p:style>
+            <a:lnRef idx="2">
+              <a:schemeClr val="accent1">
+                <a:shade val="15000"/>
+              </a:schemeClr>
+            </a:lnRef>
+            <a:fillRef idx="1">
+              <a:schemeClr val="accent1"/>
+            </a:fillRef>
+            <a:effectRef idx="0">
+              <a:schemeClr val="accent1"/>
+            </a:effectRef>
+            <a:fontRef idx="minor">
+              <a:schemeClr val="lt1"/>
+            </a:fontRef>
+          </p:style>
+          <p:txBody>
+            <a:bodyPr rtlCol="0" anchor="ctr"/>
+            <a:lstStyle/>
+            <a:p>
+              <a:pPr algn="ctr"/>
+              <a:endParaRPr lang="es-MX"/>
+            </a:p>
+          </p:txBody>
+        </p:sp>
+        <p:sp>
+          <p:nvSpPr>
+            <p:cNvPr id="28" name="Rectángulo 27">
+              <a:extLst>
+                <a:ext uri="{FF2B5EF4-FFF2-40B4-BE49-F238E27FC236}">
+                  <a16:creationId xmlns:a16="http://schemas.microsoft.com/office/drawing/2014/main" id="{8A9AD0D4-AC87-2C7D-C98A-AEA2BEB779A7}"/>
+                </a:ext>
+              </a:extLst>
+            </p:cNvPr>
+            <p:cNvSpPr/>
+            <p:nvPr/>
+          </p:nvSpPr>
+          <p:spPr>
+            <a:xfrm>
+              <a:off x="7091680" y="1572867"/>
+              <a:ext cx="4185920" cy="900000"/>
+            </a:xfrm>
+            <a:prstGeom prst="rect">
+              <a:avLst/>
+            </a:prstGeom>
+            <a:grpFill/>
+            <a:ln>
+              <a:noFill/>
+            </a:ln>
+          </p:spPr>
+          <p:style>
+            <a:lnRef idx="2">
+              <a:schemeClr val="accent1">
+                <a:shade val="15000"/>
+              </a:schemeClr>
+            </a:lnRef>
+            <a:fillRef idx="1">
+              <a:schemeClr val="accent1"/>
+            </a:fillRef>
+            <a:effectRef idx="0">
+              <a:schemeClr val="accent1"/>
+            </a:effectRef>
+            <a:fontRef idx="minor">
+              <a:schemeClr val="lt1"/>
+            </a:fontRef>
+          </p:style>
+          <p:txBody>
+            <a:bodyPr rtlCol="0" anchor="ctr"/>
+            <a:lstStyle/>
+            <a:p>
+              <a:pPr algn="ctr"/>
+              <a:endParaRPr lang="es-MX"/>
+            </a:p>
+          </p:txBody>
+        </p:sp>
+      </p:grpSp>
+      <p:pic>
+        <p:nvPicPr>
+          <p:cNvPr id="9" name="Marcador de contenido 8" descr="Gráfico, Gráfico de barras&#10;&#10;El contenido generado por IA puede ser incorrecto.">
+            <a:extLst>
+              <a:ext uri="{FF2B5EF4-FFF2-40B4-BE49-F238E27FC236}">
+                <a16:creationId xmlns:a16="http://schemas.microsoft.com/office/drawing/2014/main" id="{5B7F2C80-DCD5-5CF6-7E2D-E90E28DDC305}"/>
+              </a:ext>
+            </a:extLst>
+          </p:cNvPr>
+          <p:cNvPicPr>
+            <a:picLocks noGrp="1" noChangeAspect="1"/>
+          </p:cNvPicPr>
+          <p:nvPr>
+            <p:ph idx="1"/>
+          </p:nvPr>
+        </p:nvPicPr>
+        <p:blipFill>
+          <a:blip r:embed="rId2">
+            <a:extLst>
+              <a:ext uri="{28A0092B-C50C-407E-A947-70E740481C1C}">
+                <a14:useLocalDpi xmlns:a14="http://schemas.microsoft.com/office/drawing/2010/main" val="0"/>
+              </a:ext>
+            </a:extLst>
+          </a:blip>
+          <a:stretch>
+            <a:fillRect/>
+          </a:stretch>
+        </p:blipFill>
+        <p:spPr>
+          <a:xfrm>
+            <a:off x="124767" y="1508071"/>
+            <a:ext cx="6100493" cy="4845359"/>
+          </a:xfrm>
+        </p:spPr>
+      </p:pic>
       <p:sp>
         <p:nvSpPr>
           <p:cNvPr id="2" name="Título 1">
@@ -3747,36 +4624,544 @@
           <a:lstStyle/>
           <a:p>
             <a:r>
-              <a:rPr lang="es-MX" sz="3200" b="1" dirty="0">
-                <a:latin typeface="Century Gothic" panose="020B0502020202020204" pitchFamily="34" charset="0"/>
-              </a:rPr>
-              <a:t>Hallazgo 1</a:t>
-            </a:r>
-          </a:p>
-        </p:txBody>
-      </p:sp>
-      <p:sp>
-        <p:nvSpPr>
-          <p:cNvPr id="3" name="Marcador de contenido 2">
-            <a:extLst>
-              <a:ext uri="{FF2B5EF4-FFF2-40B4-BE49-F238E27FC236}">
-                <a16:creationId xmlns:a16="http://schemas.microsoft.com/office/drawing/2014/main" id="{560AF5A5-291C-A4FD-4D32-ABAD004AD073}"/>
-              </a:ext>
-            </a:extLst>
-          </p:cNvPr>
-          <p:cNvSpPr>
-            <a:spLocks noGrp="1"/>
-          </p:cNvSpPr>
-          <p:nvPr>
-            <p:ph idx="1"/>
-          </p:nvPr>
-        </p:nvSpPr>
-        <p:spPr/>
-        <p:txBody>
-          <a:bodyPr/>
+              <a:rPr lang="es-MX" sz="5400" b="1" dirty="0">
+                <a:latin typeface="Bebas Neue" panose="020B0606020202050201" pitchFamily="34" charset="0"/>
+              </a:rPr>
+              <a:t>¿Qué se reporta y cuándo?</a:t>
+            </a:r>
+          </a:p>
+        </p:txBody>
+      </p:sp>
+      <p:pic>
+        <p:nvPicPr>
+          <p:cNvPr id="11" name="Gráfico 10" descr="Calendario giratorio con relleno sólido">
+            <a:extLst>
+              <a:ext uri="{FF2B5EF4-FFF2-40B4-BE49-F238E27FC236}">
+                <a16:creationId xmlns:a16="http://schemas.microsoft.com/office/drawing/2014/main" id="{574831E8-8D2C-27E6-0F9D-D9904D344AD9}"/>
+              </a:ext>
+            </a:extLst>
+          </p:cNvPr>
+          <p:cNvPicPr>
+            <a:picLocks noChangeAspect="1"/>
+          </p:cNvPicPr>
+          <p:nvPr/>
+        </p:nvPicPr>
+        <p:blipFill>
+          <a:blip r:embed="rId3">
+            <a:extLst>
+              <a:ext uri="{96DAC541-7B7A-43D3-8B79-37D633B846F1}">
+                <asvg:svgBlip xmlns:asvg="http://schemas.microsoft.com/office/drawing/2016/SVG/main" r:embed="rId4"/>
+              </a:ext>
+            </a:extLst>
+          </a:blip>
+          <a:stretch>
+            <a:fillRect/>
+          </a:stretch>
+        </p:blipFill>
+        <p:spPr>
+          <a:xfrm>
+            <a:off x="10608626" y="2568126"/>
+            <a:ext cx="914400" cy="914400"/>
+          </a:xfrm>
+          <a:prstGeom prst="rect">
+            <a:avLst/>
+          </a:prstGeom>
+        </p:spPr>
+      </p:pic>
+      <p:pic>
+        <p:nvPicPr>
+          <p:cNvPr id="13" name="Gráfico 12" descr="Reloj con relleno sólido">
+            <a:extLst>
+              <a:ext uri="{FF2B5EF4-FFF2-40B4-BE49-F238E27FC236}">
+                <a16:creationId xmlns:a16="http://schemas.microsoft.com/office/drawing/2014/main" id="{0641ED8F-138A-55B9-0B7B-6C8C8E942D32}"/>
+              </a:ext>
+            </a:extLst>
+          </p:cNvPr>
+          <p:cNvPicPr>
+            <a:picLocks noChangeAspect="1"/>
+          </p:cNvPicPr>
+          <p:nvPr/>
+        </p:nvPicPr>
+        <p:blipFill>
+          <a:blip r:embed="rId5">
+            <a:extLst>
+              <a:ext uri="{96DAC541-7B7A-43D3-8B79-37D633B846F1}">
+                <asvg:svgBlip xmlns:asvg="http://schemas.microsoft.com/office/drawing/2016/SVG/main" r:embed="rId6"/>
+              </a:ext>
+            </a:extLst>
+          </a:blip>
+          <a:stretch>
+            <a:fillRect/>
+          </a:stretch>
+        </p:blipFill>
+        <p:spPr>
+          <a:xfrm>
+            <a:off x="10665973" y="3590410"/>
+            <a:ext cx="900000" cy="900000"/>
+          </a:xfrm>
+          <a:prstGeom prst="rect">
+            <a:avLst/>
+          </a:prstGeom>
+        </p:spPr>
+      </p:pic>
+      <p:pic>
+        <p:nvPicPr>
+          <p:cNvPr id="16" name="Gráfico 15" descr="Baile con relleno sólido">
+            <a:extLst>
+              <a:ext uri="{FF2B5EF4-FFF2-40B4-BE49-F238E27FC236}">
+                <a16:creationId xmlns:a16="http://schemas.microsoft.com/office/drawing/2014/main" id="{9F013633-CDAE-9648-FF45-D34EA11B43BC}"/>
+              </a:ext>
+            </a:extLst>
+          </p:cNvPr>
+          <p:cNvPicPr>
+            <a:picLocks noChangeAspect="1"/>
+          </p:cNvPicPr>
+          <p:nvPr/>
+        </p:nvPicPr>
+        <p:blipFill>
+          <a:blip r:embed="rId7">
+            <a:extLst>
+              <a:ext uri="{96DAC541-7B7A-43D3-8B79-37D633B846F1}">
+                <asvg:svgBlip xmlns:asvg="http://schemas.microsoft.com/office/drawing/2016/SVG/main" r:embed="rId8"/>
+              </a:ext>
+            </a:extLst>
+          </a:blip>
+          <a:stretch>
+            <a:fillRect/>
+          </a:stretch>
+        </p:blipFill>
+        <p:spPr>
+          <a:xfrm>
+            <a:off x="10618458" y="1606610"/>
+            <a:ext cx="875622" cy="875622"/>
+          </a:xfrm>
+          <a:prstGeom prst="rect">
+            <a:avLst/>
+          </a:prstGeom>
+        </p:spPr>
+      </p:pic>
+      <p:sp>
+        <p:nvSpPr>
+          <p:cNvPr id="26" name="CuadroTexto 25">
+            <a:extLst>
+              <a:ext uri="{FF2B5EF4-FFF2-40B4-BE49-F238E27FC236}">
+                <a16:creationId xmlns:a16="http://schemas.microsoft.com/office/drawing/2014/main" id="{90E54F62-5A47-C1A9-6394-A1167A2034DC}"/>
+              </a:ext>
+            </a:extLst>
+          </p:cNvPr>
+          <p:cNvSpPr txBox="1"/>
+          <p:nvPr/>
+        </p:nvSpPr>
+        <p:spPr>
+          <a:xfrm>
+            <a:off x="6653595" y="1627093"/>
+            <a:ext cx="1740860" cy="923330"/>
+          </a:xfrm>
+          <a:prstGeom prst="rect">
+            <a:avLst/>
+          </a:prstGeom>
+          <a:noFill/>
+        </p:spPr>
+        <p:txBody>
+          <a:bodyPr wrap="square" rtlCol="0">
+            <a:spAutoFit/>
+          </a:bodyPr>
           <a:lstStyle/>
           <a:p>
-            <a:endParaRPr lang="es-MX"/>
+            <a:r>
+              <a:rPr lang="es-MX" sz="5400" dirty="0">
+                <a:solidFill>
+                  <a:schemeClr val="bg1"/>
+                </a:solidFill>
+                <a:latin typeface="Bebas Neue" panose="020B0606020202050201" pitchFamily="34" charset="0"/>
+                <a:cs typeface="Arial" panose="020B0604020202020204" pitchFamily="34" charset="0"/>
+              </a:rPr>
+              <a:t>~50%</a:t>
+            </a:r>
+          </a:p>
+        </p:txBody>
+      </p:sp>
+      <p:sp>
+        <p:nvSpPr>
+          <p:cNvPr id="27" name="CuadroTexto 26">
+            <a:extLst>
+              <a:ext uri="{FF2B5EF4-FFF2-40B4-BE49-F238E27FC236}">
+                <a16:creationId xmlns:a16="http://schemas.microsoft.com/office/drawing/2014/main" id="{A1C72A9C-D9BA-96F7-5E47-0E00FF631E79}"/>
+              </a:ext>
+            </a:extLst>
+          </p:cNvPr>
+          <p:cNvSpPr txBox="1"/>
+          <p:nvPr/>
+        </p:nvSpPr>
+        <p:spPr>
+          <a:xfrm>
+            <a:off x="8023615" y="1633945"/>
+            <a:ext cx="2533255" cy="830997"/>
+          </a:xfrm>
+          <a:prstGeom prst="rect">
+            <a:avLst/>
+          </a:prstGeom>
+          <a:noFill/>
+        </p:spPr>
+        <p:txBody>
+          <a:bodyPr wrap="square" rtlCol="0">
+            <a:spAutoFit/>
+          </a:bodyPr>
+          <a:lstStyle/>
+          <a:p>
+            <a:r>
+              <a:rPr lang="es-MX" sz="1600" dirty="0">
+                <a:solidFill>
+                  <a:schemeClr val="bg1"/>
+                </a:solidFill>
+              </a:rPr>
+              <a:t>de los reportes son de las categorías de </a:t>
+            </a:r>
+            <a:r>
+              <a:rPr lang="es-MX" sz="1600" b="1" dirty="0">
+                <a:solidFill>
+                  <a:schemeClr val="bg1"/>
+                </a:solidFill>
+              </a:rPr>
+              <a:t>convivencia</a:t>
+            </a:r>
+            <a:r>
+              <a:rPr lang="es-MX" sz="1600" dirty="0">
+                <a:solidFill>
+                  <a:schemeClr val="bg1"/>
+                </a:solidFill>
+              </a:rPr>
+              <a:t> y </a:t>
+            </a:r>
+            <a:r>
+              <a:rPr lang="es-MX" sz="1600" b="1" dirty="0">
+                <a:solidFill>
+                  <a:schemeClr val="bg1"/>
+                </a:solidFill>
+              </a:rPr>
+              <a:t>violencia</a:t>
+            </a:r>
+          </a:p>
+        </p:txBody>
+      </p:sp>
+      <p:sp>
+        <p:nvSpPr>
+          <p:cNvPr id="40" name="CuadroTexto 39">
+            <a:extLst>
+              <a:ext uri="{FF2B5EF4-FFF2-40B4-BE49-F238E27FC236}">
+                <a16:creationId xmlns:a16="http://schemas.microsoft.com/office/drawing/2014/main" id="{0C0E0606-86A4-E57B-219E-DC390248DEE9}"/>
+              </a:ext>
+            </a:extLst>
+          </p:cNvPr>
+          <p:cNvSpPr txBox="1"/>
+          <p:nvPr/>
+        </p:nvSpPr>
+        <p:spPr>
+          <a:xfrm>
+            <a:off x="6636653" y="3610074"/>
+            <a:ext cx="1740860" cy="923330"/>
+          </a:xfrm>
+          <a:prstGeom prst="rect">
+            <a:avLst/>
+          </a:prstGeom>
+          <a:noFill/>
+        </p:spPr>
+        <p:txBody>
+          <a:bodyPr wrap="square" rtlCol="0">
+            <a:spAutoFit/>
+          </a:bodyPr>
+          <a:lstStyle/>
+          <a:p>
+            <a:r>
+              <a:rPr lang="es-MX" sz="5400" dirty="0">
+                <a:solidFill>
+                  <a:schemeClr val="bg1"/>
+                </a:solidFill>
+                <a:latin typeface="Bebas Neue" panose="020B0606020202050201" pitchFamily="34" charset="0"/>
+                <a:cs typeface="Arial" panose="020B0604020202020204" pitchFamily="34" charset="0"/>
+              </a:rPr>
+              <a:t> 32%</a:t>
+            </a:r>
+          </a:p>
+        </p:txBody>
+      </p:sp>
+      <p:sp>
+        <p:nvSpPr>
+          <p:cNvPr id="41" name="CuadroTexto 40">
+            <a:extLst>
+              <a:ext uri="{FF2B5EF4-FFF2-40B4-BE49-F238E27FC236}">
+                <a16:creationId xmlns:a16="http://schemas.microsoft.com/office/drawing/2014/main" id="{B964A5E8-EDBC-1E1A-988A-098D0AC549A7}"/>
+              </a:ext>
+            </a:extLst>
+          </p:cNvPr>
+          <p:cNvSpPr txBox="1"/>
+          <p:nvPr/>
+        </p:nvSpPr>
+        <p:spPr>
+          <a:xfrm>
+            <a:off x="7906209" y="3609074"/>
+            <a:ext cx="2851364" cy="830997"/>
+          </a:xfrm>
+          <a:prstGeom prst="rect">
+            <a:avLst/>
+          </a:prstGeom>
+          <a:noFill/>
+        </p:spPr>
+        <p:txBody>
+          <a:bodyPr wrap="square" rtlCol="0">
+            <a:spAutoFit/>
+          </a:bodyPr>
+          <a:lstStyle/>
+          <a:p>
+            <a:r>
+              <a:rPr lang="es-MX" sz="1600" dirty="0">
+                <a:solidFill>
+                  <a:schemeClr val="bg1"/>
+                </a:solidFill>
+              </a:rPr>
+              <a:t>de los reportes se hacen por la </a:t>
+            </a:r>
+            <a:r>
+              <a:rPr lang="es-MX" sz="1600" b="1" dirty="0">
+                <a:solidFill>
+                  <a:schemeClr val="bg1"/>
+                </a:solidFill>
+              </a:rPr>
+              <a:t>noche</a:t>
+            </a:r>
+            <a:r>
+              <a:rPr lang="es-MX" sz="1600" dirty="0">
+                <a:solidFill>
+                  <a:schemeClr val="bg1"/>
+                </a:solidFill>
+              </a:rPr>
+              <a:t> (18:00– 23:59), seguido del 25.7% por la tarde</a:t>
+            </a:r>
+          </a:p>
+        </p:txBody>
+      </p:sp>
+      <p:sp>
+        <p:nvSpPr>
+          <p:cNvPr id="42" name="CuadroTexto 41">
+            <a:extLst>
+              <a:ext uri="{FF2B5EF4-FFF2-40B4-BE49-F238E27FC236}">
+                <a16:creationId xmlns:a16="http://schemas.microsoft.com/office/drawing/2014/main" id="{D57D2429-DE78-810E-1F5E-F4B8DDD7DA76}"/>
+              </a:ext>
+            </a:extLst>
+          </p:cNvPr>
+          <p:cNvSpPr txBox="1"/>
+          <p:nvPr/>
+        </p:nvSpPr>
+        <p:spPr>
+          <a:xfrm>
+            <a:off x="6754176" y="2626763"/>
+            <a:ext cx="3960344" cy="830997"/>
+          </a:xfrm>
+          <a:prstGeom prst="rect">
+            <a:avLst/>
+          </a:prstGeom>
+          <a:noFill/>
+        </p:spPr>
+        <p:txBody>
+          <a:bodyPr wrap="square" rtlCol="0">
+            <a:spAutoFit/>
+          </a:bodyPr>
+          <a:lstStyle/>
+          <a:p>
+            <a:r>
+              <a:rPr lang="es-MX" sz="1600" dirty="0">
+                <a:solidFill>
+                  <a:schemeClr val="bg1"/>
+                </a:solidFill>
+              </a:rPr>
+              <a:t>El </a:t>
+            </a:r>
+            <a:r>
+              <a:rPr lang="es-MX" sz="1600" b="1" dirty="0">
+                <a:solidFill>
+                  <a:schemeClr val="bg1"/>
+                </a:solidFill>
+              </a:rPr>
+              <a:t>domingo</a:t>
+            </a:r>
+            <a:r>
+              <a:rPr lang="es-MX" sz="1600" dirty="0">
+                <a:solidFill>
+                  <a:schemeClr val="bg1"/>
+                </a:solidFill>
+              </a:rPr>
+              <a:t> es el día de la semana </a:t>
+            </a:r>
+            <a:r>
+              <a:rPr lang="es-MX" sz="1600" b="1" dirty="0">
+                <a:solidFill>
+                  <a:schemeClr val="bg1"/>
+                </a:solidFill>
+              </a:rPr>
+              <a:t>más crítico</a:t>
+            </a:r>
+            <a:r>
+              <a:rPr lang="es-MX" sz="1600" dirty="0">
+                <a:solidFill>
+                  <a:schemeClr val="bg1"/>
+                </a:solidFill>
+              </a:rPr>
+              <a:t>, con la mayor cantidad de reportes, seguido por los días sábado.</a:t>
+            </a:r>
+          </a:p>
+        </p:txBody>
+      </p:sp>
+      <p:sp>
+        <p:nvSpPr>
+          <p:cNvPr id="43" name="CuadroTexto 42">
+            <a:extLst>
+              <a:ext uri="{FF2B5EF4-FFF2-40B4-BE49-F238E27FC236}">
+                <a16:creationId xmlns:a16="http://schemas.microsoft.com/office/drawing/2014/main" id="{394DD36C-1DE5-F6AB-7529-3381E59AC165}"/>
+              </a:ext>
+            </a:extLst>
+          </p:cNvPr>
+          <p:cNvSpPr txBox="1"/>
+          <p:nvPr/>
+        </p:nvSpPr>
+        <p:spPr>
+          <a:xfrm>
+            <a:off x="10765975" y="2918994"/>
+            <a:ext cx="614452" cy="461665"/>
+          </a:xfrm>
+          <a:prstGeom prst="rect">
+            <a:avLst/>
+          </a:prstGeom>
+          <a:noFill/>
+        </p:spPr>
+        <p:txBody>
+          <a:bodyPr wrap="square" rtlCol="0">
+            <a:spAutoFit/>
+          </a:bodyPr>
+          <a:lstStyle/>
+          <a:p>
+            <a:r>
+              <a:rPr lang="es-MX" sz="2400" dirty="0" err="1">
+                <a:solidFill>
+                  <a:schemeClr val="bg1"/>
+                </a:solidFill>
+                <a:latin typeface="Bebas Neue" panose="020B0606020202050201" pitchFamily="34" charset="0"/>
+              </a:rPr>
+              <a:t>dOM</a:t>
+            </a:r>
+            <a:endParaRPr lang="es-MX" sz="2400" dirty="0">
+              <a:solidFill>
+                <a:schemeClr val="bg1"/>
+              </a:solidFill>
+              <a:latin typeface="Bebas Neue" panose="020B0606020202050201" pitchFamily="34" charset="0"/>
+            </a:endParaRPr>
+          </a:p>
+        </p:txBody>
+      </p:sp>
+      <p:pic>
+        <p:nvPicPr>
+          <p:cNvPr id="47" name="Imagen 46">
+            <a:extLst>
+              <a:ext uri="{FF2B5EF4-FFF2-40B4-BE49-F238E27FC236}">
+                <a16:creationId xmlns:a16="http://schemas.microsoft.com/office/drawing/2014/main" id="{DDE4101A-BA23-3AAB-5F09-7FFB3DF62DB8}"/>
+              </a:ext>
+            </a:extLst>
+          </p:cNvPr>
+          <p:cNvPicPr>
+            <a:picLocks noChangeAspect="1"/>
+          </p:cNvPicPr>
+          <p:nvPr/>
+        </p:nvPicPr>
+        <p:blipFill>
+          <a:blip r:embed="rId9"/>
+          <a:stretch>
+            <a:fillRect/>
+          </a:stretch>
+        </p:blipFill>
+        <p:spPr>
+          <a:xfrm>
+            <a:off x="6635443" y="4687469"/>
+            <a:ext cx="4930530" cy="1774090"/>
+          </a:xfrm>
+          <a:prstGeom prst="rect">
+            <a:avLst/>
+          </a:prstGeom>
+        </p:spPr>
+      </p:pic>
+      <p:sp>
+        <p:nvSpPr>
+          <p:cNvPr id="48" name="CuadroTexto 47">
+            <a:extLst>
+              <a:ext uri="{FF2B5EF4-FFF2-40B4-BE49-F238E27FC236}">
+                <a16:creationId xmlns:a16="http://schemas.microsoft.com/office/drawing/2014/main" id="{30B6FCB6-117F-6CF6-9880-233C5415E00D}"/>
+              </a:ext>
+            </a:extLst>
+          </p:cNvPr>
+          <p:cNvSpPr txBox="1"/>
+          <p:nvPr/>
+        </p:nvSpPr>
+        <p:spPr>
+          <a:xfrm>
+            <a:off x="213360" y="6455776"/>
+            <a:ext cx="11978640" cy="400110"/>
+          </a:xfrm>
+          <a:prstGeom prst="rect">
+            <a:avLst/>
+          </a:prstGeom>
+          <a:noFill/>
+        </p:spPr>
+        <p:txBody>
+          <a:bodyPr wrap="square" rtlCol="0">
+            <a:spAutoFit/>
+          </a:bodyPr>
+          <a:lstStyle/>
+          <a:p>
+            <a:r>
+              <a:rPr lang="es-ES" sz="1000" b="1" dirty="0">
+                <a:solidFill>
+                  <a:schemeClr val="bg2">
+                    <a:lumMod val="75000"/>
+                  </a:schemeClr>
+                </a:solidFill>
+              </a:rPr>
+              <a:t>Fuente</a:t>
+            </a:r>
+            <a:r>
+              <a:rPr lang="es-ES" sz="1000" dirty="0">
+                <a:solidFill>
+                  <a:schemeClr val="bg2">
+                    <a:lumMod val="75000"/>
+                  </a:schemeClr>
+                </a:solidFill>
+              </a:rPr>
+              <a:t>: Plataforma Nacional de Transparencia. (2024). </a:t>
+            </a:r>
+            <a:r>
+              <a:rPr lang="es-ES" sz="1000" i="1" dirty="0">
+                <a:solidFill>
+                  <a:schemeClr val="bg2">
+                    <a:lumMod val="75000"/>
+                  </a:schemeClr>
+                </a:solidFill>
+              </a:rPr>
+              <a:t>Datos de reportes de llamadas de incidencias recibidas a través de llamadas telefónicas al número de emergencias 9-1-1 (2018-2025)</a:t>
+            </a:r>
+            <a:r>
+              <a:rPr lang="es-ES" sz="1000" dirty="0">
+                <a:solidFill>
+                  <a:schemeClr val="bg2">
+                    <a:lumMod val="75000"/>
+                  </a:schemeClr>
+                </a:solidFill>
+              </a:rPr>
+              <a:t>. [Solicitud de Transparencia Folio: 261156825000213]. Recuperado de https://www.plataformanacionaldetransparencia.org.mx</a:t>
+            </a:r>
+            <a:endParaRPr lang="es-MX" sz="1000" dirty="0">
+              <a:solidFill>
+                <a:schemeClr val="bg2">
+                  <a:lumMod val="75000"/>
+                </a:schemeClr>
+              </a:solidFill>
+            </a:endParaRPr>
           </a:p>
         </p:txBody>
       </p:sp>
@@ -3815,7 +5200,7 @@
           <p:cNvPr id="2" name="Título 1">
             <a:extLst>
               <a:ext uri="{FF2B5EF4-FFF2-40B4-BE49-F238E27FC236}">
-                <a16:creationId xmlns:a16="http://schemas.microsoft.com/office/drawing/2014/main" id="{1418635E-4C19-5B15-3FFD-AC662CA58AE0}"/>
+                <a16:creationId xmlns:a16="http://schemas.microsoft.com/office/drawing/2014/main" id="{853F083C-BE77-06D0-24FA-0ABF286655FA}"/>
               </a:ext>
             </a:extLst>
           </p:cNvPr>
@@ -3834,43 +5219,841 @@
           <a:lstStyle/>
           <a:p>
             <a:r>
-              <a:rPr lang="es-MX" sz="3200" b="1" dirty="0">
-                <a:latin typeface="Century Gothic" panose="020B0502020202020204" pitchFamily="34" charset="0"/>
-              </a:rPr>
-              <a:t>Hallazgo 2</a:t>
-            </a:r>
-          </a:p>
-        </p:txBody>
-      </p:sp>
-      <p:sp>
-        <p:nvSpPr>
-          <p:cNvPr id="3" name="Marcador de contenido 2">
-            <a:extLst>
-              <a:ext uri="{FF2B5EF4-FFF2-40B4-BE49-F238E27FC236}">
-                <a16:creationId xmlns:a16="http://schemas.microsoft.com/office/drawing/2014/main" id="{8F9C2502-6382-56C8-FDC0-E78A17ABF013}"/>
-              </a:ext>
-            </a:extLst>
-          </p:cNvPr>
-          <p:cNvSpPr>
-            <a:spLocks noGrp="1"/>
-          </p:cNvSpPr>
-          <p:nvPr>
-            <p:ph idx="1"/>
-          </p:nvPr>
-        </p:nvSpPr>
-        <p:spPr/>
-        <p:txBody>
-          <a:bodyPr/>
+              <a:rPr lang="es-MX" sz="5400" b="1" dirty="0">
+                <a:latin typeface="Bebas Neue" panose="020B0606020202050201" pitchFamily="34" charset="0"/>
+              </a:rPr>
+              <a:t>¿Dónde hay más crimen?</a:t>
+            </a:r>
+          </a:p>
+        </p:txBody>
+      </p:sp>
+      <p:grpSp>
+        <p:nvGrpSpPr>
+          <p:cNvPr id="26" name="Grupo 25">
+            <a:extLst>
+              <a:ext uri="{FF2B5EF4-FFF2-40B4-BE49-F238E27FC236}">
+                <a16:creationId xmlns:a16="http://schemas.microsoft.com/office/drawing/2014/main" id="{B75C751F-2782-4BEB-B999-4DB1EA810C2A}"/>
+              </a:ext>
+            </a:extLst>
+          </p:cNvPr>
+          <p:cNvGrpSpPr/>
+          <p:nvPr/>
+        </p:nvGrpSpPr>
+        <p:grpSpPr>
+          <a:xfrm>
+            <a:off x="6520287" y="3996253"/>
+            <a:ext cx="5607694" cy="1610323"/>
+            <a:chOff x="6301065" y="5194579"/>
+            <a:chExt cx="5607694" cy="1610323"/>
+          </a:xfrm>
+        </p:grpSpPr>
+        <p:grpSp>
+          <p:nvGrpSpPr>
+            <p:cNvPr id="19" name="Grupo 18">
+              <a:extLst>
+                <a:ext uri="{FF2B5EF4-FFF2-40B4-BE49-F238E27FC236}">
+                  <a16:creationId xmlns:a16="http://schemas.microsoft.com/office/drawing/2014/main" id="{6C48E8FF-4782-C20B-FC97-2D14B06FF8E2}"/>
+                </a:ext>
+              </a:extLst>
+            </p:cNvPr>
+            <p:cNvGrpSpPr/>
+            <p:nvPr/>
+          </p:nvGrpSpPr>
+          <p:grpSpPr>
+            <a:xfrm>
+              <a:off x="6301065" y="5194579"/>
+              <a:ext cx="4903231" cy="1608186"/>
+              <a:chOff x="6404304" y="1577131"/>
+              <a:chExt cx="4625960" cy="900000"/>
+            </a:xfrm>
+            <a:solidFill>
+              <a:schemeClr val="accent2">
+                <a:lumMod val="75000"/>
+              </a:schemeClr>
+            </a:solidFill>
+          </p:grpSpPr>
+          <p:sp>
+            <p:nvSpPr>
+              <p:cNvPr id="21" name="Elipse 20">
+                <a:extLst>
+                  <a:ext uri="{FF2B5EF4-FFF2-40B4-BE49-F238E27FC236}">
+                    <a16:creationId xmlns:a16="http://schemas.microsoft.com/office/drawing/2014/main" id="{392EB493-6079-F42C-E005-7020B29C5D5F}"/>
+                  </a:ext>
+                </a:extLst>
+              </p:cNvPr>
+              <p:cNvSpPr/>
+              <p:nvPr/>
+            </p:nvSpPr>
+            <p:spPr>
+              <a:xfrm>
+                <a:off x="6404304" y="1579358"/>
+                <a:ext cx="1352911" cy="895903"/>
+              </a:xfrm>
+              <a:prstGeom prst="ellipse">
+                <a:avLst/>
+              </a:prstGeom>
+              <a:grpFill/>
+              <a:ln>
+                <a:noFill/>
+              </a:ln>
+            </p:spPr>
+            <p:style>
+              <a:lnRef idx="2">
+                <a:schemeClr val="accent1">
+                  <a:shade val="15000"/>
+                </a:schemeClr>
+              </a:lnRef>
+              <a:fillRef idx="1">
+                <a:schemeClr val="accent1"/>
+              </a:fillRef>
+              <a:effectRef idx="0">
+                <a:schemeClr val="accent1"/>
+              </a:effectRef>
+              <a:fontRef idx="minor">
+                <a:schemeClr val="lt1"/>
+              </a:fontRef>
+            </p:style>
+            <p:txBody>
+              <a:bodyPr rtlCol="0" anchor="ctr"/>
+              <a:lstStyle/>
+              <a:p>
+                <a:pPr algn="ctr"/>
+                <a:endParaRPr lang="es-MX" dirty="0"/>
+              </a:p>
+            </p:txBody>
+          </p:sp>
+          <p:sp>
+            <p:nvSpPr>
+              <p:cNvPr id="22" name="Rectángulo 21">
+                <a:extLst>
+                  <a:ext uri="{FF2B5EF4-FFF2-40B4-BE49-F238E27FC236}">
+                    <a16:creationId xmlns:a16="http://schemas.microsoft.com/office/drawing/2014/main" id="{072EEDF1-FD38-B138-F279-4DD76DE33EF7}"/>
+                  </a:ext>
+                </a:extLst>
+              </p:cNvPr>
+              <p:cNvSpPr/>
+              <p:nvPr/>
+            </p:nvSpPr>
+            <p:spPr>
+              <a:xfrm>
+                <a:off x="7091681" y="1577131"/>
+                <a:ext cx="3938583" cy="900000"/>
+              </a:xfrm>
+              <a:prstGeom prst="rect">
+                <a:avLst/>
+              </a:prstGeom>
+              <a:grpFill/>
+              <a:ln>
+                <a:noFill/>
+              </a:ln>
+            </p:spPr>
+            <p:style>
+              <a:lnRef idx="2">
+                <a:schemeClr val="accent1">
+                  <a:shade val="15000"/>
+                </a:schemeClr>
+              </a:lnRef>
+              <a:fillRef idx="1">
+                <a:schemeClr val="accent1"/>
+              </a:fillRef>
+              <a:effectRef idx="0">
+                <a:schemeClr val="accent1"/>
+              </a:effectRef>
+              <a:fontRef idx="minor">
+                <a:schemeClr val="lt1"/>
+              </a:fontRef>
+            </p:style>
+            <p:txBody>
+              <a:bodyPr rtlCol="0" anchor="ctr"/>
+              <a:lstStyle/>
+              <a:p>
+                <a:pPr algn="ctr"/>
+                <a:endParaRPr lang="es-MX" dirty="0"/>
+              </a:p>
+            </p:txBody>
+          </p:sp>
+        </p:grpSp>
+        <p:sp>
+          <p:nvSpPr>
+            <p:cNvPr id="25" name="Elipse 24">
+              <a:extLst>
+                <a:ext uri="{FF2B5EF4-FFF2-40B4-BE49-F238E27FC236}">
+                  <a16:creationId xmlns:a16="http://schemas.microsoft.com/office/drawing/2014/main" id="{8DD8F2F2-9FD4-E072-161B-64189D6AF876}"/>
+                </a:ext>
+              </a:extLst>
+            </p:cNvPr>
+            <p:cNvSpPr/>
+            <p:nvPr/>
+          </p:nvSpPr>
+          <p:spPr>
+            <a:xfrm>
+              <a:off x="10474757" y="5196716"/>
+              <a:ext cx="1434002" cy="1608186"/>
+            </a:xfrm>
+            <a:prstGeom prst="ellipse">
+              <a:avLst/>
+            </a:prstGeom>
+            <a:solidFill>
+              <a:schemeClr val="accent2">
+                <a:lumMod val="75000"/>
+              </a:schemeClr>
+            </a:solidFill>
+            <a:ln>
+              <a:noFill/>
+            </a:ln>
+          </p:spPr>
+          <p:style>
+            <a:lnRef idx="2">
+              <a:schemeClr val="accent1">
+                <a:shade val="15000"/>
+              </a:schemeClr>
+            </a:lnRef>
+            <a:fillRef idx="1">
+              <a:schemeClr val="accent1"/>
+            </a:fillRef>
+            <a:effectRef idx="0">
+              <a:schemeClr val="accent1"/>
+            </a:effectRef>
+            <a:fontRef idx="minor">
+              <a:schemeClr val="lt1"/>
+            </a:fontRef>
+          </p:style>
+          <p:txBody>
+            <a:bodyPr rtlCol="0" anchor="ctr"/>
+            <a:lstStyle/>
+            <a:p>
+              <a:pPr algn="ctr"/>
+              <a:endParaRPr lang="es-MX" dirty="0"/>
+            </a:p>
+          </p:txBody>
+        </p:sp>
+      </p:grpSp>
+      <p:sp>
+        <p:nvSpPr>
+          <p:cNvPr id="23" name="CuadroTexto 22">
+            <a:extLst>
+              <a:ext uri="{FF2B5EF4-FFF2-40B4-BE49-F238E27FC236}">
+                <a16:creationId xmlns:a16="http://schemas.microsoft.com/office/drawing/2014/main" id="{4B766020-A1AB-5C04-E841-A67F5732F03C}"/>
+              </a:ext>
+            </a:extLst>
+          </p:cNvPr>
+          <p:cNvSpPr txBox="1"/>
+          <p:nvPr/>
+        </p:nvSpPr>
+        <p:spPr>
+          <a:xfrm>
+            <a:off x="6709440" y="4099521"/>
+            <a:ext cx="5276652" cy="1723549"/>
+          </a:xfrm>
+          <a:prstGeom prst="rect">
+            <a:avLst/>
+          </a:prstGeom>
+          <a:noFill/>
+        </p:spPr>
+        <p:txBody>
+          <a:bodyPr wrap="square" rtlCol="0">
+            <a:spAutoFit/>
+          </a:bodyPr>
           <a:lstStyle/>
           <a:p>
-            <a:endParaRPr lang="es-MX"/>
+            <a:r>
+              <a:rPr lang="es-ES" sz="1600" dirty="0">
+                <a:solidFill>
+                  <a:schemeClr val="bg1"/>
+                </a:solidFill>
+              </a:rPr>
+              <a:t>La </a:t>
+            </a:r>
+            <a:r>
+              <a:rPr lang="es-ES" sz="1600" b="1" dirty="0">
+                <a:solidFill>
+                  <a:schemeClr val="bg1"/>
+                </a:solidFill>
+              </a:rPr>
+              <a:t>Zona Industrial / Parque Industrial</a:t>
+            </a:r>
+            <a:r>
+              <a:rPr lang="es-ES" sz="1600" dirty="0">
+                <a:solidFill>
+                  <a:schemeClr val="bg1"/>
+                </a:solidFill>
+              </a:rPr>
+              <a:t> presenta una </a:t>
+            </a:r>
+            <a:r>
+              <a:rPr lang="es-ES" sz="1600" b="1" dirty="0">
+                <a:solidFill>
+                  <a:schemeClr val="bg1"/>
+                </a:solidFill>
+              </a:rPr>
+              <a:t>tasa de criminalidad muy elevada </a:t>
+            </a:r>
+            <a:r>
+              <a:rPr lang="es-ES" sz="1600" dirty="0">
+                <a:solidFill>
+                  <a:schemeClr val="bg1"/>
+                </a:solidFill>
+              </a:rPr>
+              <a:t>ya que tiene pocos habitantes, pero muchos incidentes, principalmente:</a:t>
+            </a:r>
+          </a:p>
+          <a:p>
+            <a:pPr marL="285750" indent="-285750">
+              <a:buFont typeface="Arial" panose="020B0604020202020204" pitchFamily="34" charset="0"/>
+              <a:buChar char="•"/>
+            </a:pPr>
+            <a:r>
+              <a:rPr lang="es-ES" sz="1400" dirty="0">
+                <a:solidFill>
+                  <a:schemeClr val="bg1"/>
+                </a:solidFill>
+              </a:rPr>
+              <a:t>Robo a establecimientos  </a:t>
+            </a:r>
+          </a:p>
+          <a:p>
+            <a:pPr marL="285750" indent="-285750">
+              <a:buFont typeface="Arial" panose="020B0604020202020204" pitchFamily="34" charset="0"/>
+              <a:buChar char="•"/>
+            </a:pPr>
+            <a:r>
+              <a:rPr lang="es-ES" sz="1400" dirty="0">
+                <a:solidFill>
+                  <a:schemeClr val="bg1"/>
+                </a:solidFill>
+              </a:rPr>
+              <a:t>Robo de vehículos  </a:t>
+            </a:r>
+          </a:p>
+          <a:p>
+            <a:pPr marL="285750" indent="-285750">
+              <a:buFont typeface="Arial" panose="020B0604020202020204" pitchFamily="34" charset="0"/>
+              <a:buChar char="•"/>
+            </a:pPr>
+            <a:r>
+              <a:rPr lang="es-ES" sz="1400" dirty="0">
+                <a:solidFill>
+                  <a:schemeClr val="bg1"/>
+                </a:solidFill>
+              </a:rPr>
+              <a:t>Incidentes asociados a actividad comercial y logística</a:t>
+            </a:r>
+          </a:p>
+          <a:p>
+            <a:endParaRPr lang="es-MX" sz="1600" b="1" dirty="0">
+              <a:solidFill>
+                <a:schemeClr val="bg1"/>
+              </a:solidFill>
+            </a:endParaRPr>
+          </a:p>
+        </p:txBody>
+      </p:sp>
+      <p:grpSp>
+        <p:nvGrpSpPr>
+          <p:cNvPr id="37" name="Grupo 36">
+            <a:extLst>
+              <a:ext uri="{FF2B5EF4-FFF2-40B4-BE49-F238E27FC236}">
+                <a16:creationId xmlns:a16="http://schemas.microsoft.com/office/drawing/2014/main" id="{720D7C02-E0A8-5A6F-D61A-3026ED98B976}"/>
+              </a:ext>
+            </a:extLst>
+          </p:cNvPr>
+          <p:cNvGrpSpPr/>
+          <p:nvPr/>
+        </p:nvGrpSpPr>
+        <p:grpSpPr>
+          <a:xfrm>
+            <a:off x="6520677" y="1804143"/>
+            <a:ext cx="5607694" cy="1720346"/>
+            <a:chOff x="356926" y="5127582"/>
+            <a:chExt cx="5607694" cy="1720346"/>
+          </a:xfrm>
+          <a:solidFill>
+            <a:srgbClr val="C00000"/>
+          </a:solidFill>
+        </p:grpSpPr>
+        <p:grpSp>
+          <p:nvGrpSpPr>
+            <p:cNvPr id="27" name="Grupo 26">
+              <a:extLst>
+                <a:ext uri="{FF2B5EF4-FFF2-40B4-BE49-F238E27FC236}">
+                  <a16:creationId xmlns:a16="http://schemas.microsoft.com/office/drawing/2014/main" id="{97CA0F7F-08A0-ABFF-6B11-E6F62C48DEA1}"/>
+                </a:ext>
+              </a:extLst>
+            </p:cNvPr>
+            <p:cNvGrpSpPr/>
+            <p:nvPr/>
+          </p:nvGrpSpPr>
+          <p:grpSpPr>
+            <a:xfrm>
+              <a:off x="356926" y="5127582"/>
+              <a:ext cx="5607694" cy="1611531"/>
+              <a:chOff x="6301065" y="5191237"/>
+              <a:chExt cx="5607694" cy="1611531"/>
+            </a:xfrm>
+            <a:grpFill/>
+          </p:grpSpPr>
+          <p:grpSp>
+            <p:nvGrpSpPr>
+              <p:cNvPr id="28" name="Grupo 27">
+                <a:extLst>
+                  <a:ext uri="{FF2B5EF4-FFF2-40B4-BE49-F238E27FC236}">
+                    <a16:creationId xmlns:a16="http://schemas.microsoft.com/office/drawing/2014/main" id="{CA4A40DA-4C5D-FAC4-CEF6-106BD65AFDC8}"/>
+                  </a:ext>
+                </a:extLst>
+              </p:cNvPr>
+              <p:cNvGrpSpPr/>
+              <p:nvPr/>
+            </p:nvGrpSpPr>
+            <p:grpSpPr>
+              <a:xfrm>
+                <a:off x="6301065" y="5194581"/>
+                <a:ext cx="4903231" cy="1608187"/>
+                <a:chOff x="6404304" y="1577131"/>
+                <a:chExt cx="4625960" cy="900000"/>
+              </a:xfrm>
+              <a:grpFill/>
+            </p:grpSpPr>
+            <p:sp>
+              <p:nvSpPr>
+                <p:cNvPr id="30" name="Elipse 29">
+                  <a:extLst>
+                    <a:ext uri="{FF2B5EF4-FFF2-40B4-BE49-F238E27FC236}">
+                      <a16:creationId xmlns:a16="http://schemas.microsoft.com/office/drawing/2014/main" id="{1FB4A676-E01E-FBCB-27AC-A7F9F367F3BE}"/>
+                    </a:ext>
+                  </a:extLst>
+                </p:cNvPr>
+                <p:cNvSpPr/>
+                <p:nvPr/>
+              </p:nvSpPr>
+              <p:spPr>
+                <a:xfrm>
+                  <a:off x="6404304" y="1578382"/>
+                  <a:ext cx="1352911" cy="895903"/>
+                </a:xfrm>
+                <a:prstGeom prst="ellipse">
+                  <a:avLst/>
+                </a:prstGeom>
+                <a:grpFill/>
+                <a:ln>
+                  <a:noFill/>
+                </a:ln>
+              </p:spPr>
+              <p:style>
+                <a:lnRef idx="2">
+                  <a:schemeClr val="accent1">
+                    <a:shade val="15000"/>
+                  </a:schemeClr>
+                </a:lnRef>
+                <a:fillRef idx="1">
+                  <a:schemeClr val="accent1"/>
+                </a:fillRef>
+                <a:effectRef idx="0">
+                  <a:schemeClr val="accent1"/>
+                </a:effectRef>
+                <a:fontRef idx="minor">
+                  <a:schemeClr val="lt1"/>
+                </a:fontRef>
+              </p:style>
+              <p:txBody>
+                <a:bodyPr rtlCol="0" anchor="ctr"/>
+                <a:lstStyle/>
+                <a:p>
+                  <a:pPr algn="ctr"/>
+                  <a:endParaRPr lang="es-MX" dirty="0"/>
+                </a:p>
+              </p:txBody>
+            </p:sp>
+            <p:sp>
+              <p:nvSpPr>
+                <p:cNvPr id="31" name="Rectángulo 30">
+                  <a:extLst>
+                    <a:ext uri="{FF2B5EF4-FFF2-40B4-BE49-F238E27FC236}">
+                      <a16:creationId xmlns:a16="http://schemas.microsoft.com/office/drawing/2014/main" id="{7F2B72E8-CCE1-AB08-E2FB-768242385841}"/>
+                    </a:ext>
+                  </a:extLst>
+                </p:cNvPr>
+                <p:cNvSpPr/>
+                <p:nvPr/>
+              </p:nvSpPr>
+              <p:spPr>
+                <a:xfrm>
+                  <a:off x="7091681" y="1577131"/>
+                  <a:ext cx="3938583" cy="900000"/>
+                </a:xfrm>
+                <a:prstGeom prst="rect">
+                  <a:avLst/>
+                </a:prstGeom>
+                <a:grpFill/>
+                <a:ln>
+                  <a:noFill/>
+                </a:ln>
+              </p:spPr>
+              <p:style>
+                <a:lnRef idx="2">
+                  <a:schemeClr val="accent1">
+                    <a:shade val="15000"/>
+                  </a:schemeClr>
+                </a:lnRef>
+                <a:fillRef idx="1">
+                  <a:schemeClr val="accent1"/>
+                </a:fillRef>
+                <a:effectRef idx="0">
+                  <a:schemeClr val="accent1"/>
+                </a:effectRef>
+                <a:fontRef idx="minor">
+                  <a:schemeClr val="lt1"/>
+                </a:fontRef>
+              </p:style>
+              <p:txBody>
+                <a:bodyPr rtlCol="0" anchor="ctr"/>
+                <a:lstStyle/>
+                <a:p>
+                  <a:pPr algn="ctr"/>
+                  <a:endParaRPr lang="es-MX" dirty="0"/>
+                </a:p>
+              </p:txBody>
+            </p:sp>
+          </p:grpSp>
+          <p:sp>
+            <p:nvSpPr>
+              <p:cNvPr id="29" name="Elipse 28">
+                <a:extLst>
+                  <a:ext uri="{FF2B5EF4-FFF2-40B4-BE49-F238E27FC236}">
+                    <a16:creationId xmlns:a16="http://schemas.microsoft.com/office/drawing/2014/main" id="{124854F1-4AC7-23AF-55A9-AAC7F857AF5E}"/>
+                  </a:ext>
+                </a:extLst>
+              </p:cNvPr>
+              <p:cNvSpPr/>
+              <p:nvPr/>
+            </p:nvSpPr>
+            <p:spPr>
+              <a:xfrm>
+                <a:off x="10474757" y="5191237"/>
+                <a:ext cx="1434002" cy="1608186"/>
+              </a:xfrm>
+              <a:prstGeom prst="ellipse">
+                <a:avLst/>
+              </a:prstGeom>
+              <a:grpFill/>
+              <a:ln>
+                <a:noFill/>
+              </a:ln>
+            </p:spPr>
+            <p:style>
+              <a:lnRef idx="2">
+                <a:schemeClr val="accent1">
+                  <a:shade val="15000"/>
+                </a:schemeClr>
+              </a:lnRef>
+              <a:fillRef idx="1">
+                <a:schemeClr val="accent1"/>
+              </a:fillRef>
+              <a:effectRef idx="0">
+                <a:schemeClr val="accent1"/>
+              </a:effectRef>
+              <a:fontRef idx="minor">
+                <a:schemeClr val="lt1"/>
+              </a:fontRef>
+            </p:style>
+            <p:txBody>
+              <a:bodyPr rtlCol="0" anchor="ctr"/>
+              <a:lstStyle/>
+              <a:p>
+                <a:pPr algn="ctr"/>
+                <a:endParaRPr lang="es-MX" dirty="0"/>
+              </a:p>
+            </p:txBody>
+          </p:sp>
+        </p:grpSp>
+        <p:sp>
+          <p:nvSpPr>
+            <p:cNvPr id="32" name="CuadroTexto 31">
+              <a:extLst>
+                <a:ext uri="{FF2B5EF4-FFF2-40B4-BE49-F238E27FC236}">
+                  <a16:creationId xmlns:a16="http://schemas.microsoft.com/office/drawing/2014/main" id="{91B1E793-19E7-BDA2-0DBE-8C53FCB5CF60}"/>
+                </a:ext>
+              </a:extLst>
+            </p:cNvPr>
+            <p:cNvSpPr txBox="1"/>
+            <p:nvPr/>
+          </p:nvSpPr>
+          <p:spPr>
+            <a:xfrm>
+              <a:off x="579593" y="5278268"/>
+              <a:ext cx="5276652" cy="1569660"/>
+            </a:xfrm>
+            <a:prstGeom prst="rect">
+              <a:avLst/>
+            </a:prstGeom>
+            <a:noFill/>
+          </p:spPr>
+          <p:txBody>
+            <a:bodyPr wrap="square" rtlCol="0">
+              <a:spAutoFit/>
+            </a:bodyPr>
+            <a:lstStyle/>
+            <a:p>
+              <a:r>
+                <a:rPr lang="es-ES" sz="1600" dirty="0">
+                  <a:solidFill>
+                    <a:schemeClr val="bg1"/>
+                  </a:solidFill>
+                </a:rPr>
+                <a:t>El </a:t>
+              </a:r>
+              <a:r>
+                <a:rPr lang="es-ES" sz="1600" b="1" dirty="0">
+                  <a:solidFill>
+                    <a:schemeClr val="bg1"/>
+                  </a:solidFill>
+                </a:rPr>
+                <a:t>Centro</a:t>
+              </a:r>
+              <a:r>
+                <a:rPr lang="es-ES" sz="1600" dirty="0">
+                  <a:solidFill>
+                    <a:schemeClr val="bg1"/>
+                  </a:solidFill>
+                </a:rPr>
+                <a:t> de Hermosillo concentra la mayor cantidad de incidentes reportados, triplicando prácticamente el volumen del segundo lugar. Esto puede deberse a su</a:t>
+              </a:r>
+              <a:r>
+                <a:rPr lang="es-ES" sz="1600" b="1" dirty="0">
+                  <a:solidFill>
+                    <a:schemeClr val="bg1"/>
+                  </a:solidFill>
+                </a:rPr>
+                <a:t> alta densidad poblacional y comercial, </a:t>
+              </a:r>
+              <a:r>
+                <a:rPr lang="es-ES" sz="1600" dirty="0">
+                  <a:solidFill>
+                    <a:schemeClr val="bg1"/>
+                  </a:solidFill>
+                </a:rPr>
+                <a:t>así como su </a:t>
+              </a:r>
+              <a:r>
+                <a:rPr lang="es-ES" sz="1600" b="1" dirty="0">
+                  <a:solidFill>
+                    <a:schemeClr val="bg1"/>
+                  </a:solidFill>
+                </a:rPr>
+                <a:t>afluencia </a:t>
+              </a:r>
+              <a:r>
+                <a:rPr lang="es-ES" sz="1600" dirty="0">
+                  <a:solidFill>
+                    <a:schemeClr val="bg1"/>
+                  </a:solidFill>
+                </a:rPr>
+                <a:t>por ser zona urbana central.</a:t>
+              </a:r>
+            </a:p>
+            <a:p>
+              <a:endParaRPr lang="es-MX" sz="1600" b="1" dirty="0">
+                <a:solidFill>
+                  <a:schemeClr val="bg1"/>
+                </a:solidFill>
+              </a:endParaRPr>
+            </a:p>
+          </p:txBody>
+        </p:sp>
+      </p:grpSp>
+      <p:pic>
+        <p:nvPicPr>
+          <p:cNvPr id="34" name="Imagen 33">
+            <a:extLst>
+              <a:ext uri="{FF2B5EF4-FFF2-40B4-BE49-F238E27FC236}">
+                <a16:creationId xmlns:a16="http://schemas.microsoft.com/office/drawing/2014/main" id="{064963AB-2BEB-D377-8BD9-D6ED3CA36610}"/>
+              </a:ext>
+            </a:extLst>
+          </p:cNvPr>
+          <p:cNvPicPr>
+            <a:picLocks noChangeAspect="1"/>
+          </p:cNvPicPr>
+          <p:nvPr/>
+        </p:nvPicPr>
+        <p:blipFill>
+          <a:blip r:embed="rId2"/>
+          <a:stretch>
+            <a:fillRect/>
+          </a:stretch>
+        </p:blipFill>
+        <p:spPr>
+          <a:xfrm>
+            <a:off x="234556" y="1593948"/>
+            <a:ext cx="6174787" cy="2028576"/>
+          </a:xfrm>
+          <a:prstGeom prst="rect">
+            <a:avLst/>
+          </a:prstGeom>
+        </p:spPr>
+      </p:pic>
+      <p:pic>
+        <p:nvPicPr>
+          <p:cNvPr id="36" name="Imagen 35">
+            <a:extLst>
+              <a:ext uri="{FF2B5EF4-FFF2-40B4-BE49-F238E27FC236}">
+                <a16:creationId xmlns:a16="http://schemas.microsoft.com/office/drawing/2014/main" id="{8A5CB232-D6B5-A969-A801-6FD6179864E3}"/>
+              </a:ext>
+            </a:extLst>
+          </p:cNvPr>
+          <p:cNvPicPr>
+            <a:picLocks noChangeAspect="1"/>
+          </p:cNvPicPr>
+          <p:nvPr/>
+        </p:nvPicPr>
+        <p:blipFill>
+          <a:blip r:embed="rId3"/>
+          <a:stretch>
+            <a:fillRect/>
+          </a:stretch>
+        </p:blipFill>
+        <p:spPr>
+          <a:xfrm>
+            <a:off x="64019" y="3876500"/>
+            <a:ext cx="6314379" cy="1938278"/>
+          </a:xfrm>
+          <a:prstGeom prst="rect">
+            <a:avLst/>
+          </a:prstGeom>
+        </p:spPr>
+      </p:pic>
+      <p:sp>
+        <p:nvSpPr>
+          <p:cNvPr id="41" name="CuadroTexto 40">
+            <a:extLst>
+              <a:ext uri="{FF2B5EF4-FFF2-40B4-BE49-F238E27FC236}">
+                <a16:creationId xmlns:a16="http://schemas.microsoft.com/office/drawing/2014/main" id="{A127032D-204D-2283-BA7E-84DA80DEDFB9}"/>
+              </a:ext>
+            </a:extLst>
+          </p:cNvPr>
+          <p:cNvSpPr txBox="1"/>
+          <p:nvPr/>
+        </p:nvSpPr>
+        <p:spPr>
+          <a:xfrm>
+            <a:off x="213360" y="6150169"/>
+            <a:ext cx="11978640" cy="784830"/>
+          </a:xfrm>
+          <a:prstGeom prst="rect">
+            <a:avLst/>
+          </a:prstGeom>
+          <a:noFill/>
+        </p:spPr>
+        <p:txBody>
+          <a:bodyPr wrap="square" rtlCol="0">
+            <a:spAutoFit/>
+          </a:bodyPr>
+          <a:lstStyle/>
+          <a:p>
+            <a:r>
+              <a:rPr lang="es-ES" sz="900" b="1" dirty="0">
+                <a:solidFill>
+                  <a:schemeClr val="bg2">
+                    <a:lumMod val="75000"/>
+                  </a:schemeClr>
+                </a:solidFill>
+              </a:rPr>
+              <a:t>Fuente</a:t>
+            </a:r>
+            <a:r>
+              <a:rPr lang="es-ES" sz="900" dirty="0">
+                <a:solidFill>
+                  <a:schemeClr val="bg2">
+                    <a:lumMod val="75000"/>
+                  </a:schemeClr>
+                </a:solidFill>
+              </a:rPr>
+              <a:t>: Plataforma Nacional de Transparencia. (2024). </a:t>
+            </a:r>
+            <a:r>
+              <a:rPr lang="es-ES" sz="900" i="1" dirty="0">
+                <a:solidFill>
+                  <a:schemeClr val="bg2">
+                    <a:lumMod val="75000"/>
+                  </a:schemeClr>
+                </a:solidFill>
+              </a:rPr>
+              <a:t>Datos de reportes de llamadas de incidencias recibidas a través de llamadas telefónicas al número de emergencias 9-1-1 (2018-2025)</a:t>
+            </a:r>
+            <a:r>
+              <a:rPr lang="es-ES" sz="900" dirty="0">
+                <a:solidFill>
+                  <a:schemeClr val="bg2">
+                    <a:lumMod val="75000"/>
+                  </a:schemeClr>
+                </a:solidFill>
+              </a:rPr>
+              <a:t>. [Solicitud de Transparencia Folio: 261156825000213]. Recuperado de </a:t>
+            </a:r>
+            <a:r>
+              <a:rPr lang="es-ES" sz="900" dirty="0">
+                <a:solidFill>
+                  <a:schemeClr val="bg2">
+                    <a:lumMod val="75000"/>
+                  </a:schemeClr>
+                </a:solidFill>
+                <a:hlinkClick r:id="rId4"/>
+              </a:rPr>
+              <a:t>https://www.plataformanacionaldetransparencia.org.mx</a:t>
+            </a:r>
+            <a:endParaRPr lang="es-ES" sz="900" dirty="0">
+              <a:solidFill>
+                <a:schemeClr val="bg2">
+                  <a:lumMod val="75000"/>
+                </a:schemeClr>
+              </a:solidFill>
+            </a:endParaRPr>
+          </a:p>
+          <a:p>
+            <a:r>
+              <a:rPr lang="es-ES" sz="900" dirty="0">
+                <a:solidFill>
+                  <a:schemeClr val="bg2">
+                    <a:lumMod val="75000"/>
+                  </a:schemeClr>
+                </a:solidFill>
+              </a:rPr>
+              <a:t>Sonora en Datos. (2020). </a:t>
+            </a:r>
+            <a:r>
+              <a:rPr lang="es-ES" sz="900" dirty="0" err="1">
+                <a:solidFill>
+                  <a:schemeClr val="bg2">
+                    <a:lumMod val="75000"/>
+                  </a:schemeClr>
+                </a:solidFill>
+              </a:rPr>
+              <a:t>ColoniasSonora</a:t>
+            </a:r>
+            <a:r>
+              <a:rPr lang="es-ES" sz="900" dirty="0">
+                <a:solidFill>
+                  <a:schemeClr val="bg2">
+                    <a:lumMod val="75000"/>
+                  </a:schemeClr>
+                </a:solidFill>
+              </a:rPr>
+              <a:t>: Mapa interactivo de las colonias de Sonora. [Repositorio de GitHub y Mapa Web]. Recuperado de https://sonora-en-datos.github.io/ColoniasSonora/. De esta fuente se obtuvieron los polígonos geoespaciales y la información demográfica del Censo 2020 utilizada en este análisis.</a:t>
+            </a:r>
+          </a:p>
+          <a:p>
+            <a:endParaRPr lang="es-MX" sz="900" dirty="0">
+              <a:solidFill>
+                <a:schemeClr val="bg2">
+                  <a:lumMod val="75000"/>
+                </a:schemeClr>
+              </a:solidFill>
+            </a:endParaRPr>
           </a:p>
         </p:txBody>
       </p:sp>
     </p:spTree>
     <p:extLst>
       <p:ext uri="{BB962C8B-B14F-4D97-AF65-F5344CB8AC3E}">
-        <p14:creationId xmlns:p14="http://schemas.microsoft.com/office/powerpoint/2010/main" val="1672516701"/>
+        <p14:creationId xmlns:p14="http://schemas.microsoft.com/office/powerpoint/2010/main" val="1149290121"/>
       </p:ext>
     </p:extLst>
   </p:cSld>
@@ -3902,7 +6085,7 @@
           <p:cNvPr id="2" name="Título 1">
             <a:extLst>
               <a:ext uri="{FF2B5EF4-FFF2-40B4-BE49-F238E27FC236}">
-                <a16:creationId xmlns:a16="http://schemas.microsoft.com/office/drawing/2014/main" id="{853F083C-BE77-06D0-24FA-0ABF286655FA}"/>
+                <a16:creationId xmlns:a16="http://schemas.microsoft.com/office/drawing/2014/main" id="{1418635E-4C19-5B15-3FFD-AC662CA58AE0}"/>
               </a:ext>
             </a:extLst>
           </p:cNvPr>
@@ -3921,43 +6104,1045 @@
           <a:lstStyle/>
           <a:p>
             <a:r>
-              <a:rPr lang="es-MX" sz="3200" b="1" dirty="0">
-                <a:latin typeface="Century Gothic" panose="020B0502020202020204" pitchFamily="34" charset="0"/>
-              </a:rPr>
-              <a:t>Hallazgo 3</a:t>
-            </a:r>
-          </a:p>
-        </p:txBody>
-      </p:sp>
-      <p:sp>
-        <p:nvSpPr>
-          <p:cNvPr id="3" name="Marcador de contenido 2">
-            <a:extLst>
-              <a:ext uri="{FF2B5EF4-FFF2-40B4-BE49-F238E27FC236}">
-                <a16:creationId xmlns:a16="http://schemas.microsoft.com/office/drawing/2014/main" id="{C22DE071-FDDC-2BF5-1B68-219517C1FA9A}"/>
-              </a:ext>
-            </a:extLst>
-          </p:cNvPr>
-          <p:cNvSpPr>
-            <a:spLocks noGrp="1"/>
-          </p:cNvSpPr>
+              <a:rPr lang="es-MX" sz="5400" b="1" dirty="0">
+                <a:latin typeface="Bebas Neue" panose="020B0606020202050201" pitchFamily="34" charset="0"/>
+              </a:rPr>
+              <a:t>¿Hay algún indicador de criminalidad?</a:t>
+            </a:r>
+          </a:p>
+        </p:txBody>
+      </p:sp>
+      <p:pic>
+        <p:nvPicPr>
+          <p:cNvPr id="4" name="Marcador de contenido 3" descr="Gráfico, Gráfico de barras, Gráfico en cascada&#10;&#10;El contenido generado por IA puede ser incorrecto.">
+            <a:extLst>
+              <a:ext uri="{FF2B5EF4-FFF2-40B4-BE49-F238E27FC236}">
+                <a16:creationId xmlns:a16="http://schemas.microsoft.com/office/drawing/2014/main" id="{E467C4DC-36ED-E9DC-B50E-967D3F06E13A}"/>
+              </a:ext>
+            </a:extLst>
+          </p:cNvPr>
+          <p:cNvPicPr>
+            <a:picLocks noGrp="1" noChangeAspect="1"/>
+          </p:cNvPicPr>
           <p:nvPr>
             <p:ph idx="1"/>
           </p:nvPr>
-        </p:nvSpPr>
-        <p:spPr/>
-        <p:txBody>
-          <a:bodyPr/>
+        </p:nvPicPr>
+        <p:blipFill>
+          <a:blip r:embed="rId2">
+            <a:extLst>
+              <a:ext uri="{28A0092B-C50C-407E-A947-70E740481C1C}">
+                <a14:useLocalDpi xmlns:a14="http://schemas.microsoft.com/office/drawing/2010/main" val="0"/>
+              </a:ext>
+            </a:extLst>
+          </a:blip>
+          <a:stretch>
+            <a:fillRect/>
+          </a:stretch>
+        </p:blipFill>
+        <p:spPr>
+          <a:xfrm>
+            <a:off x="309990" y="1690688"/>
+            <a:ext cx="6582697" cy="4351338"/>
+          </a:xfrm>
+          <a:prstGeom prst="rect">
+            <a:avLst/>
+          </a:prstGeom>
+        </p:spPr>
+      </p:pic>
+      <p:grpSp>
+        <p:nvGrpSpPr>
+          <p:cNvPr id="3" name="Grupo 2">
+            <a:extLst>
+              <a:ext uri="{FF2B5EF4-FFF2-40B4-BE49-F238E27FC236}">
+                <a16:creationId xmlns:a16="http://schemas.microsoft.com/office/drawing/2014/main" id="{9CB43D8E-EE36-4F3D-AD02-93B4D0240BBB}"/>
+              </a:ext>
+            </a:extLst>
+          </p:cNvPr>
+          <p:cNvGrpSpPr/>
+          <p:nvPr/>
+        </p:nvGrpSpPr>
+        <p:grpSpPr>
+          <a:xfrm>
+            <a:off x="6892687" y="2113464"/>
+            <a:ext cx="5083516" cy="902787"/>
+            <a:chOff x="6651284" y="1572867"/>
+            <a:chExt cx="5083516" cy="902787"/>
+          </a:xfrm>
+          <a:solidFill>
+            <a:schemeClr val="tx2">
+              <a:lumMod val="90000"/>
+              <a:lumOff val="10000"/>
+            </a:schemeClr>
+          </a:solidFill>
+        </p:grpSpPr>
+        <p:sp>
+          <p:nvSpPr>
+            <p:cNvPr id="5" name="Elipse 4">
+              <a:extLst>
+                <a:ext uri="{FF2B5EF4-FFF2-40B4-BE49-F238E27FC236}">
+                  <a16:creationId xmlns:a16="http://schemas.microsoft.com/office/drawing/2014/main" id="{5ECC65DF-A7CE-F5E4-5A93-977D24C57AAE}"/>
+                </a:ext>
+              </a:extLst>
+            </p:cNvPr>
+            <p:cNvSpPr/>
+            <p:nvPr/>
+          </p:nvSpPr>
+          <p:spPr>
+            <a:xfrm>
+              <a:off x="10834800" y="1575654"/>
+              <a:ext cx="900000" cy="900000"/>
+            </a:xfrm>
+            <a:prstGeom prst="ellipse">
+              <a:avLst/>
+            </a:prstGeom>
+            <a:grpFill/>
+            <a:ln>
+              <a:noFill/>
+            </a:ln>
+          </p:spPr>
+          <p:style>
+            <a:lnRef idx="2">
+              <a:schemeClr val="accent1">
+                <a:shade val="15000"/>
+              </a:schemeClr>
+            </a:lnRef>
+            <a:fillRef idx="1">
+              <a:schemeClr val="accent1"/>
+            </a:fillRef>
+            <a:effectRef idx="0">
+              <a:schemeClr val="accent1"/>
+            </a:effectRef>
+            <a:fontRef idx="minor">
+              <a:schemeClr val="lt1"/>
+            </a:fontRef>
+          </p:style>
+          <p:txBody>
+            <a:bodyPr rtlCol="0" anchor="ctr"/>
+            <a:lstStyle/>
+            <a:p>
+              <a:pPr algn="ctr"/>
+              <a:endParaRPr lang="es-MX"/>
+            </a:p>
+          </p:txBody>
+        </p:sp>
+        <p:sp>
+          <p:nvSpPr>
+            <p:cNvPr id="6" name="Elipse 5">
+              <a:extLst>
+                <a:ext uri="{FF2B5EF4-FFF2-40B4-BE49-F238E27FC236}">
+                  <a16:creationId xmlns:a16="http://schemas.microsoft.com/office/drawing/2014/main" id="{12EFE254-15FC-5313-5BA3-3321A926C712}"/>
+                </a:ext>
+              </a:extLst>
+            </p:cNvPr>
+            <p:cNvSpPr/>
+            <p:nvPr/>
+          </p:nvSpPr>
+          <p:spPr>
+            <a:xfrm>
+              <a:off x="6651284" y="1574627"/>
+              <a:ext cx="900000" cy="900000"/>
+            </a:xfrm>
+            <a:prstGeom prst="ellipse">
+              <a:avLst/>
+            </a:prstGeom>
+            <a:grpFill/>
+            <a:ln>
+              <a:noFill/>
+            </a:ln>
+          </p:spPr>
+          <p:style>
+            <a:lnRef idx="2">
+              <a:schemeClr val="accent1">
+                <a:shade val="15000"/>
+              </a:schemeClr>
+            </a:lnRef>
+            <a:fillRef idx="1">
+              <a:schemeClr val="accent1"/>
+            </a:fillRef>
+            <a:effectRef idx="0">
+              <a:schemeClr val="accent1"/>
+            </a:effectRef>
+            <a:fontRef idx="minor">
+              <a:schemeClr val="lt1"/>
+            </a:fontRef>
+          </p:style>
+          <p:txBody>
+            <a:bodyPr rtlCol="0" anchor="ctr"/>
+            <a:lstStyle/>
+            <a:p>
+              <a:pPr algn="ctr"/>
+              <a:endParaRPr lang="es-MX"/>
+            </a:p>
+          </p:txBody>
+        </p:sp>
+        <p:sp>
+          <p:nvSpPr>
+            <p:cNvPr id="7" name="Rectángulo 6">
+              <a:extLst>
+                <a:ext uri="{FF2B5EF4-FFF2-40B4-BE49-F238E27FC236}">
+                  <a16:creationId xmlns:a16="http://schemas.microsoft.com/office/drawing/2014/main" id="{497E4795-6ABC-801A-EC53-9465995A5FF8}"/>
+                </a:ext>
+              </a:extLst>
+            </p:cNvPr>
+            <p:cNvSpPr/>
+            <p:nvPr/>
+          </p:nvSpPr>
+          <p:spPr>
+            <a:xfrm>
+              <a:off x="7091680" y="1572867"/>
+              <a:ext cx="4185920" cy="900000"/>
+            </a:xfrm>
+            <a:prstGeom prst="rect">
+              <a:avLst/>
+            </a:prstGeom>
+            <a:grpFill/>
+            <a:ln>
+              <a:noFill/>
+            </a:ln>
+          </p:spPr>
+          <p:style>
+            <a:lnRef idx="2">
+              <a:schemeClr val="accent1">
+                <a:shade val="15000"/>
+              </a:schemeClr>
+            </a:lnRef>
+            <a:fillRef idx="1">
+              <a:schemeClr val="accent1"/>
+            </a:fillRef>
+            <a:effectRef idx="0">
+              <a:schemeClr val="accent1"/>
+            </a:effectRef>
+            <a:fontRef idx="minor">
+              <a:schemeClr val="lt1"/>
+            </a:fontRef>
+          </p:style>
+          <p:txBody>
+            <a:bodyPr rtlCol="0" anchor="ctr"/>
+            <a:lstStyle/>
+            <a:p>
+              <a:pPr algn="ctr"/>
+              <a:endParaRPr lang="es-MX"/>
+            </a:p>
+          </p:txBody>
+        </p:sp>
+      </p:grpSp>
+      <p:grpSp>
+        <p:nvGrpSpPr>
+          <p:cNvPr id="8" name="Grupo 7">
+            <a:extLst>
+              <a:ext uri="{FF2B5EF4-FFF2-40B4-BE49-F238E27FC236}">
+                <a16:creationId xmlns:a16="http://schemas.microsoft.com/office/drawing/2014/main" id="{1CD4FB5C-49CE-797E-8FE7-8E9E02AE3B1D}"/>
+              </a:ext>
+            </a:extLst>
+          </p:cNvPr>
+          <p:cNvGrpSpPr/>
+          <p:nvPr/>
+        </p:nvGrpSpPr>
+        <p:grpSpPr>
+          <a:xfrm>
+            <a:off x="6892687" y="3172684"/>
+            <a:ext cx="5083516" cy="902787"/>
+            <a:chOff x="6651284" y="1572867"/>
+            <a:chExt cx="5083516" cy="902787"/>
+          </a:xfrm>
+          <a:solidFill>
+            <a:schemeClr val="tx2">
+              <a:lumMod val="75000"/>
+              <a:lumOff val="25000"/>
+            </a:schemeClr>
+          </a:solidFill>
+        </p:grpSpPr>
+        <p:sp>
+          <p:nvSpPr>
+            <p:cNvPr id="9" name="Elipse 8">
+              <a:extLst>
+                <a:ext uri="{FF2B5EF4-FFF2-40B4-BE49-F238E27FC236}">
+                  <a16:creationId xmlns:a16="http://schemas.microsoft.com/office/drawing/2014/main" id="{BC842E72-264B-1B96-73D1-52EDBA498538}"/>
+                </a:ext>
+              </a:extLst>
+            </p:cNvPr>
+            <p:cNvSpPr/>
+            <p:nvPr/>
+          </p:nvSpPr>
+          <p:spPr>
+            <a:xfrm>
+              <a:off x="10834800" y="1575654"/>
+              <a:ext cx="900000" cy="900000"/>
+            </a:xfrm>
+            <a:prstGeom prst="ellipse">
+              <a:avLst/>
+            </a:prstGeom>
+            <a:grpFill/>
+            <a:ln>
+              <a:noFill/>
+            </a:ln>
+          </p:spPr>
+          <p:style>
+            <a:lnRef idx="2">
+              <a:schemeClr val="accent1">
+                <a:shade val="15000"/>
+              </a:schemeClr>
+            </a:lnRef>
+            <a:fillRef idx="1">
+              <a:schemeClr val="accent1"/>
+            </a:fillRef>
+            <a:effectRef idx="0">
+              <a:schemeClr val="accent1"/>
+            </a:effectRef>
+            <a:fontRef idx="minor">
+              <a:schemeClr val="lt1"/>
+            </a:fontRef>
+          </p:style>
+          <p:txBody>
+            <a:bodyPr rtlCol="0" anchor="ctr"/>
+            <a:lstStyle/>
+            <a:p>
+              <a:pPr algn="ctr"/>
+              <a:endParaRPr lang="es-MX"/>
+            </a:p>
+          </p:txBody>
+        </p:sp>
+        <p:sp>
+          <p:nvSpPr>
+            <p:cNvPr id="10" name="Elipse 9">
+              <a:extLst>
+                <a:ext uri="{FF2B5EF4-FFF2-40B4-BE49-F238E27FC236}">
+                  <a16:creationId xmlns:a16="http://schemas.microsoft.com/office/drawing/2014/main" id="{4B2162B0-7300-B859-3E20-70F8CE3B3369}"/>
+                </a:ext>
+              </a:extLst>
+            </p:cNvPr>
+            <p:cNvSpPr/>
+            <p:nvPr/>
+          </p:nvSpPr>
+          <p:spPr>
+            <a:xfrm>
+              <a:off x="6651284" y="1574627"/>
+              <a:ext cx="900000" cy="900000"/>
+            </a:xfrm>
+            <a:prstGeom prst="ellipse">
+              <a:avLst/>
+            </a:prstGeom>
+            <a:grpFill/>
+            <a:ln>
+              <a:noFill/>
+            </a:ln>
+          </p:spPr>
+          <p:style>
+            <a:lnRef idx="2">
+              <a:schemeClr val="accent1">
+                <a:shade val="15000"/>
+              </a:schemeClr>
+            </a:lnRef>
+            <a:fillRef idx="1">
+              <a:schemeClr val="accent1"/>
+            </a:fillRef>
+            <a:effectRef idx="0">
+              <a:schemeClr val="accent1"/>
+            </a:effectRef>
+            <a:fontRef idx="minor">
+              <a:schemeClr val="lt1"/>
+            </a:fontRef>
+          </p:style>
+          <p:txBody>
+            <a:bodyPr rtlCol="0" anchor="ctr"/>
+            <a:lstStyle/>
+            <a:p>
+              <a:pPr algn="ctr"/>
+              <a:endParaRPr lang="es-MX"/>
+            </a:p>
+          </p:txBody>
+        </p:sp>
+        <p:sp>
+          <p:nvSpPr>
+            <p:cNvPr id="11" name="Rectángulo 10">
+              <a:extLst>
+                <a:ext uri="{FF2B5EF4-FFF2-40B4-BE49-F238E27FC236}">
+                  <a16:creationId xmlns:a16="http://schemas.microsoft.com/office/drawing/2014/main" id="{1C836883-5639-1D64-A316-577B5C976165}"/>
+                </a:ext>
+              </a:extLst>
+            </p:cNvPr>
+            <p:cNvSpPr/>
+            <p:nvPr/>
+          </p:nvSpPr>
+          <p:spPr>
+            <a:xfrm>
+              <a:off x="7091680" y="1572867"/>
+              <a:ext cx="4185920" cy="900000"/>
+            </a:xfrm>
+            <a:prstGeom prst="rect">
+              <a:avLst/>
+            </a:prstGeom>
+            <a:grpFill/>
+            <a:ln>
+              <a:noFill/>
+            </a:ln>
+          </p:spPr>
+          <p:style>
+            <a:lnRef idx="2">
+              <a:schemeClr val="accent1">
+                <a:shade val="15000"/>
+              </a:schemeClr>
+            </a:lnRef>
+            <a:fillRef idx="1">
+              <a:schemeClr val="accent1"/>
+            </a:fillRef>
+            <a:effectRef idx="0">
+              <a:schemeClr val="accent1"/>
+            </a:effectRef>
+            <a:fontRef idx="minor">
+              <a:schemeClr val="lt1"/>
+            </a:fontRef>
+          </p:style>
+          <p:txBody>
+            <a:bodyPr rtlCol="0" anchor="ctr"/>
+            <a:lstStyle/>
+            <a:p>
+              <a:pPr algn="ctr"/>
+              <a:endParaRPr lang="es-MX"/>
+            </a:p>
+          </p:txBody>
+        </p:sp>
+      </p:grpSp>
+      <p:grpSp>
+        <p:nvGrpSpPr>
+          <p:cNvPr id="12" name="Grupo 11">
+            <a:extLst>
+              <a:ext uri="{FF2B5EF4-FFF2-40B4-BE49-F238E27FC236}">
+                <a16:creationId xmlns:a16="http://schemas.microsoft.com/office/drawing/2014/main" id="{B588ACE4-EE19-2B3E-062E-91EECAF200E6}"/>
+              </a:ext>
+            </a:extLst>
+          </p:cNvPr>
+          <p:cNvGrpSpPr/>
+          <p:nvPr/>
+        </p:nvGrpSpPr>
+        <p:grpSpPr>
+          <a:xfrm>
+            <a:off x="6892687" y="4264525"/>
+            <a:ext cx="5083516" cy="901760"/>
+            <a:chOff x="6651284" y="1572867"/>
+            <a:chExt cx="5083516" cy="901760"/>
+          </a:xfrm>
+          <a:solidFill>
+            <a:srgbClr val="00B050"/>
+          </a:solidFill>
+        </p:grpSpPr>
+        <p:sp>
+          <p:nvSpPr>
+            <p:cNvPr id="13" name="Elipse 12">
+              <a:extLst>
+                <a:ext uri="{FF2B5EF4-FFF2-40B4-BE49-F238E27FC236}">
+                  <a16:creationId xmlns:a16="http://schemas.microsoft.com/office/drawing/2014/main" id="{94A821E2-92B7-5644-650C-5EEEE82B7E14}"/>
+                </a:ext>
+              </a:extLst>
+            </p:cNvPr>
+            <p:cNvSpPr/>
+            <p:nvPr/>
+          </p:nvSpPr>
+          <p:spPr>
+            <a:xfrm>
+              <a:off x="10834800" y="1575654"/>
+              <a:ext cx="900000" cy="897213"/>
+            </a:xfrm>
+            <a:prstGeom prst="ellipse">
+              <a:avLst/>
+            </a:prstGeom>
+            <a:grpFill/>
+            <a:ln>
+              <a:noFill/>
+            </a:ln>
+          </p:spPr>
+          <p:style>
+            <a:lnRef idx="2">
+              <a:schemeClr val="accent1">
+                <a:shade val="15000"/>
+              </a:schemeClr>
+            </a:lnRef>
+            <a:fillRef idx="1">
+              <a:schemeClr val="accent1"/>
+            </a:fillRef>
+            <a:effectRef idx="0">
+              <a:schemeClr val="accent1"/>
+            </a:effectRef>
+            <a:fontRef idx="minor">
+              <a:schemeClr val="lt1"/>
+            </a:fontRef>
+          </p:style>
+          <p:txBody>
+            <a:bodyPr rtlCol="0" anchor="ctr"/>
+            <a:lstStyle/>
+            <a:p>
+              <a:pPr algn="ctr"/>
+              <a:endParaRPr lang="es-MX"/>
+            </a:p>
+          </p:txBody>
+        </p:sp>
+        <p:sp>
+          <p:nvSpPr>
+            <p:cNvPr id="14" name="Elipse 13">
+              <a:extLst>
+                <a:ext uri="{FF2B5EF4-FFF2-40B4-BE49-F238E27FC236}">
+                  <a16:creationId xmlns:a16="http://schemas.microsoft.com/office/drawing/2014/main" id="{05906AA0-15B8-28C0-68B4-E9D7B0DD3125}"/>
+                </a:ext>
+              </a:extLst>
+            </p:cNvPr>
+            <p:cNvSpPr/>
+            <p:nvPr/>
+          </p:nvSpPr>
+          <p:spPr>
+            <a:xfrm>
+              <a:off x="6651284" y="1574627"/>
+              <a:ext cx="900000" cy="900000"/>
+            </a:xfrm>
+            <a:prstGeom prst="ellipse">
+              <a:avLst/>
+            </a:prstGeom>
+            <a:grpFill/>
+            <a:ln>
+              <a:noFill/>
+            </a:ln>
+          </p:spPr>
+          <p:style>
+            <a:lnRef idx="2">
+              <a:schemeClr val="accent1">
+                <a:shade val="15000"/>
+              </a:schemeClr>
+            </a:lnRef>
+            <a:fillRef idx="1">
+              <a:schemeClr val="accent1"/>
+            </a:fillRef>
+            <a:effectRef idx="0">
+              <a:schemeClr val="accent1"/>
+            </a:effectRef>
+            <a:fontRef idx="minor">
+              <a:schemeClr val="lt1"/>
+            </a:fontRef>
+          </p:style>
+          <p:txBody>
+            <a:bodyPr rtlCol="0" anchor="ctr"/>
+            <a:lstStyle/>
+            <a:p>
+              <a:pPr algn="ctr"/>
+              <a:endParaRPr lang="es-MX"/>
+            </a:p>
+          </p:txBody>
+        </p:sp>
+        <p:sp>
+          <p:nvSpPr>
+            <p:cNvPr id="15" name="Rectángulo 14">
+              <a:extLst>
+                <a:ext uri="{FF2B5EF4-FFF2-40B4-BE49-F238E27FC236}">
+                  <a16:creationId xmlns:a16="http://schemas.microsoft.com/office/drawing/2014/main" id="{5505FCD2-F7BF-B053-C54D-B4C4683A0EF0}"/>
+                </a:ext>
+              </a:extLst>
+            </p:cNvPr>
+            <p:cNvSpPr/>
+            <p:nvPr/>
+          </p:nvSpPr>
+          <p:spPr>
+            <a:xfrm>
+              <a:off x="7091680" y="1572867"/>
+              <a:ext cx="4185920" cy="900000"/>
+            </a:xfrm>
+            <a:prstGeom prst="rect">
+              <a:avLst/>
+            </a:prstGeom>
+            <a:grpFill/>
+            <a:ln>
+              <a:noFill/>
+            </a:ln>
+          </p:spPr>
+          <p:style>
+            <a:lnRef idx="2">
+              <a:schemeClr val="accent1">
+                <a:shade val="15000"/>
+              </a:schemeClr>
+            </a:lnRef>
+            <a:fillRef idx="1">
+              <a:schemeClr val="accent1"/>
+            </a:fillRef>
+            <a:effectRef idx="0">
+              <a:schemeClr val="accent1"/>
+            </a:effectRef>
+            <a:fontRef idx="minor">
+              <a:schemeClr val="lt1"/>
+            </a:fontRef>
+          </p:style>
+          <p:txBody>
+            <a:bodyPr rtlCol="0" anchor="ctr"/>
+            <a:lstStyle/>
+            <a:p>
+              <a:pPr algn="ctr"/>
+              <a:endParaRPr lang="es-MX"/>
+            </a:p>
+          </p:txBody>
+        </p:sp>
+      </p:grpSp>
+      <p:sp>
+        <p:nvSpPr>
+          <p:cNvPr id="16" name="CuadroTexto 15">
+            <a:extLst>
+              <a:ext uri="{FF2B5EF4-FFF2-40B4-BE49-F238E27FC236}">
+                <a16:creationId xmlns:a16="http://schemas.microsoft.com/office/drawing/2014/main" id="{50A69B5A-3B7D-56B7-64E7-E0F46F3FE901}"/>
+              </a:ext>
+            </a:extLst>
+          </p:cNvPr>
+          <p:cNvSpPr txBox="1"/>
+          <p:nvPr/>
+        </p:nvSpPr>
+        <p:spPr>
+          <a:xfrm>
+            <a:off x="7965434" y="2159573"/>
+            <a:ext cx="3815291" cy="830997"/>
+          </a:xfrm>
+          <a:prstGeom prst="rect">
+            <a:avLst/>
+          </a:prstGeom>
+          <a:noFill/>
+        </p:spPr>
+        <p:txBody>
+          <a:bodyPr wrap="square" rtlCol="0">
+            <a:spAutoFit/>
+          </a:bodyPr>
           <a:lstStyle/>
           <a:p>
-            <a:endParaRPr lang="es-MX"/>
+            <a:r>
+              <a:rPr lang="es-MX" sz="1600" dirty="0">
+                <a:solidFill>
+                  <a:schemeClr val="bg1"/>
+                </a:solidFill>
+              </a:rPr>
+              <a:t>El </a:t>
+            </a:r>
+            <a:r>
+              <a:rPr lang="es-MX" sz="1600" b="1" dirty="0">
+                <a:solidFill>
+                  <a:schemeClr val="bg1"/>
+                </a:solidFill>
+              </a:rPr>
+              <a:t>mayor indicador </a:t>
+            </a:r>
+            <a:r>
+              <a:rPr lang="es-MX" sz="1600" dirty="0">
+                <a:solidFill>
+                  <a:schemeClr val="bg1"/>
+                </a:solidFill>
+              </a:rPr>
+              <a:t>es geográfico – </a:t>
+            </a:r>
+          </a:p>
+          <a:p>
+            <a:r>
+              <a:rPr lang="es-MX" sz="1600" b="1" dirty="0">
+                <a:solidFill>
+                  <a:schemeClr val="bg1"/>
+                </a:solidFill>
+              </a:rPr>
+              <a:t>área (km</a:t>
+            </a:r>
+            <a:r>
+              <a:rPr lang="es-MX" sz="1600" b="1" baseline="30000" dirty="0">
+                <a:solidFill>
+                  <a:schemeClr val="bg1"/>
+                </a:solidFill>
+              </a:rPr>
+              <a:t>2</a:t>
+            </a:r>
+            <a:r>
+              <a:rPr lang="es-MX" sz="1600" b="1" dirty="0">
+                <a:solidFill>
+                  <a:schemeClr val="bg1"/>
+                </a:solidFill>
+              </a:rPr>
+              <a:t>) </a:t>
+            </a:r>
+            <a:r>
+              <a:rPr lang="es-MX" sz="1600" dirty="0">
+                <a:solidFill>
+                  <a:schemeClr val="bg1"/>
+                </a:solidFill>
+              </a:rPr>
+              <a:t>muestra una alta correlación con la tasa de alta severidad en reportes</a:t>
+            </a:r>
+          </a:p>
+        </p:txBody>
+      </p:sp>
+      <p:pic>
+        <p:nvPicPr>
+          <p:cNvPr id="18" name="Gráfico 17" descr="Mapa con marcador con relleno sólido">
+            <a:extLst>
+              <a:ext uri="{FF2B5EF4-FFF2-40B4-BE49-F238E27FC236}">
+                <a16:creationId xmlns:a16="http://schemas.microsoft.com/office/drawing/2014/main" id="{6232E9F8-FE43-D22A-4723-923A71B9624F}"/>
+              </a:ext>
+            </a:extLst>
+          </p:cNvPr>
+          <p:cNvPicPr>
+            <a:picLocks noChangeAspect="1"/>
+          </p:cNvPicPr>
+          <p:nvPr/>
+        </p:nvPicPr>
+        <p:blipFill>
+          <a:blip r:embed="rId3">
+            <a:extLst>
+              <a:ext uri="{96DAC541-7B7A-43D3-8B79-37D633B846F1}">
+                <asvg:svgBlip xmlns:asvg="http://schemas.microsoft.com/office/drawing/2016/SVG/main" r:embed="rId4"/>
+              </a:ext>
+            </a:extLst>
+          </a:blip>
+          <a:stretch>
+            <a:fillRect/>
+          </a:stretch>
+        </p:blipFill>
+        <p:spPr>
+          <a:xfrm>
+            <a:off x="7021394" y="2077082"/>
+            <a:ext cx="914400" cy="914400"/>
+          </a:xfrm>
+          <a:prstGeom prst="rect">
+            <a:avLst/>
+          </a:prstGeom>
+        </p:spPr>
+      </p:pic>
+      <p:pic>
+        <p:nvPicPr>
+          <p:cNvPr id="20" name="Gráfico 19" descr="Birrete con relleno sólido">
+            <a:extLst>
+              <a:ext uri="{FF2B5EF4-FFF2-40B4-BE49-F238E27FC236}">
+                <a16:creationId xmlns:a16="http://schemas.microsoft.com/office/drawing/2014/main" id="{68DC5688-A891-ADD9-F19D-BDC96DF177B6}"/>
+              </a:ext>
+            </a:extLst>
+          </p:cNvPr>
+          <p:cNvPicPr>
+            <a:picLocks noChangeAspect="1"/>
+          </p:cNvPicPr>
+          <p:nvPr/>
+        </p:nvPicPr>
+        <p:blipFill>
+          <a:blip r:embed="rId5">
+            <a:extLst>
+              <a:ext uri="{96DAC541-7B7A-43D3-8B79-37D633B846F1}">
+                <asvg:svgBlip xmlns:asvg="http://schemas.microsoft.com/office/drawing/2016/SVG/main" r:embed="rId6"/>
+              </a:ext>
+            </a:extLst>
+          </a:blip>
+          <a:stretch>
+            <a:fillRect/>
+          </a:stretch>
+        </p:blipFill>
+        <p:spPr>
+          <a:xfrm>
+            <a:off x="7051034" y="3164007"/>
+            <a:ext cx="914400" cy="914400"/>
+          </a:xfrm>
+          <a:prstGeom prst="rect">
+            <a:avLst/>
+          </a:prstGeom>
+        </p:spPr>
+      </p:pic>
+      <p:sp>
+        <p:nvSpPr>
+          <p:cNvPr id="21" name="CuadroTexto 20">
+            <a:extLst>
+              <a:ext uri="{FF2B5EF4-FFF2-40B4-BE49-F238E27FC236}">
+                <a16:creationId xmlns:a16="http://schemas.microsoft.com/office/drawing/2014/main" id="{12A1D7E8-4391-FE17-A1AB-CBC79EEA72B6}"/>
+              </a:ext>
+            </a:extLst>
+          </p:cNvPr>
+          <p:cNvSpPr txBox="1"/>
+          <p:nvPr/>
+        </p:nvSpPr>
+        <p:spPr>
+          <a:xfrm>
+            <a:off x="7951034" y="3208092"/>
+            <a:ext cx="3977011" cy="830997"/>
+          </a:xfrm>
+          <a:prstGeom prst="rect">
+            <a:avLst/>
+          </a:prstGeom>
+          <a:noFill/>
+        </p:spPr>
+        <p:txBody>
+          <a:bodyPr wrap="square" rtlCol="0">
+            <a:spAutoFit/>
+          </a:bodyPr>
+          <a:lstStyle/>
+          <a:p>
+            <a:r>
+              <a:rPr lang="es-MX" sz="1600" dirty="0">
+                <a:solidFill>
+                  <a:schemeClr val="bg1"/>
+                </a:solidFill>
+              </a:rPr>
+              <a:t>La </a:t>
+            </a:r>
+            <a:r>
+              <a:rPr lang="es-MX" sz="1600" b="1" dirty="0">
+                <a:solidFill>
+                  <a:schemeClr val="bg1"/>
+                </a:solidFill>
+              </a:rPr>
+              <a:t>escolaridad</a:t>
+            </a:r>
+            <a:r>
+              <a:rPr lang="es-MX" sz="1600" dirty="0">
+                <a:solidFill>
+                  <a:schemeClr val="bg1"/>
+                </a:solidFill>
+              </a:rPr>
+              <a:t> promedio tiene una correlación negativa débil, </a:t>
+            </a:r>
+            <a:r>
+              <a:rPr lang="es-MX" sz="1600" b="1" dirty="0">
+                <a:solidFill>
+                  <a:schemeClr val="bg1"/>
+                </a:solidFill>
+              </a:rPr>
+              <a:t>no es un factor determinante</a:t>
+            </a:r>
+            <a:r>
+              <a:rPr lang="es-MX" sz="1600" dirty="0">
+                <a:solidFill>
+                  <a:schemeClr val="bg1"/>
+                </a:solidFill>
+              </a:rPr>
+              <a:t> de criminalidad</a:t>
+            </a:r>
+          </a:p>
+        </p:txBody>
+      </p:sp>
+      <p:sp>
+        <p:nvSpPr>
+          <p:cNvPr id="22" name="CuadroTexto 21">
+            <a:extLst>
+              <a:ext uri="{FF2B5EF4-FFF2-40B4-BE49-F238E27FC236}">
+                <a16:creationId xmlns:a16="http://schemas.microsoft.com/office/drawing/2014/main" id="{AF98E710-525B-D37D-8A61-69DFA9CF825E}"/>
+              </a:ext>
+            </a:extLst>
+          </p:cNvPr>
+          <p:cNvSpPr txBox="1"/>
+          <p:nvPr/>
+        </p:nvSpPr>
+        <p:spPr>
+          <a:xfrm>
+            <a:off x="7965434" y="4299026"/>
+            <a:ext cx="3977011" cy="830997"/>
+          </a:xfrm>
+          <a:prstGeom prst="rect">
+            <a:avLst/>
+          </a:prstGeom>
+          <a:noFill/>
+        </p:spPr>
+        <p:txBody>
+          <a:bodyPr wrap="square" rtlCol="0">
+            <a:spAutoFit/>
+          </a:bodyPr>
+          <a:lstStyle/>
+          <a:p>
+            <a:r>
+              <a:rPr lang="es-ES" sz="1600" b="1" dirty="0">
+                <a:solidFill>
+                  <a:schemeClr val="bg1"/>
+                </a:solidFill>
+              </a:rPr>
+              <a:t>Las correlaciones débiles</a:t>
+            </a:r>
+            <a:r>
+              <a:rPr lang="es-ES" sz="1600" dirty="0">
+                <a:solidFill>
+                  <a:schemeClr val="bg1"/>
+                </a:solidFill>
+              </a:rPr>
+              <a:t> sugieren que las causas de criminalidad son </a:t>
+            </a:r>
+            <a:r>
+              <a:rPr lang="es-ES" sz="1600" b="1" dirty="0">
+                <a:solidFill>
+                  <a:schemeClr val="bg1"/>
+                </a:solidFill>
+              </a:rPr>
+              <a:t>multifactoriales</a:t>
+            </a:r>
+            <a:r>
+              <a:rPr lang="es-ES" sz="1600" dirty="0">
+                <a:solidFill>
+                  <a:schemeClr val="bg1"/>
+                </a:solidFill>
+              </a:rPr>
+              <a:t>, no solo demográficas</a:t>
+            </a:r>
+          </a:p>
+        </p:txBody>
+      </p:sp>
+      <p:pic>
+        <p:nvPicPr>
+          <p:cNvPr id="24" name="Gráfico 23" descr="Red con relleno sólido">
+            <a:extLst>
+              <a:ext uri="{FF2B5EF4-FFF2-40B4-BE49-F238E27FC236}">
+                <a16:creationId xmlns:a16="http://schemas.microsoft.com/office/drawing/2014/main" id="{5BF28E69-C820-CE14-3B82-DF8C447AC4B0}"/>
+              </a:ext>
+            </a:extLst>
+          </p:cNvPr>
+          <p:cNvPicPr>
+            <a:picLocks noChangeAspect="1"/>
+          </p:cNvPicPr>
+          <p:nvPr/>
+        </p:nvPicPr>
+        <p:blipFill>
+          <a:blip r:embed="rId7">
+            <a:extLst>
+              <a:ext uri="{96DAC541-7B7A-43D3-8B79-37D633B846F1}">
+                <asvg:svgBlip xmlns:asvg="http://schemas.microsoft.com/office/drawing/2016/SVG/main" r:embed="rId8"/>
+              </a:ext>
+            </a:extLst>
+          </a:blip>
+          <a:stretch>
+            <a:fillRect/>
+          </a:stretch>
+        </p:blipFill>
+        <p:spPr>
+          <a:xfrm>
+            <a:off x="7036634" y="4240885"/>
+            <a:ext cx="914400" cy="914400"/>
+          </a:xfrm>
+          <a:prstGeom prst="rect">
+            <a:avLst/>
+          </a:prstGeom>
+        </p:spPr>
+      </p:pic>
+      <p:sp>
+        <p:nvSpPr>
+          <p:cNvPr id="25" name="CuadroTexto 24">
+            <a:extLst>
+              <a:ext uri="{FF2B5EF4-FFF2-40B4-BE49-F238E27FC236}">
+                <a16:creationId xmlns:a16="http://schemas.microsoft.com/office/drawing/2014/main" id="{CD2E716A-6F11-AA09-6EA1-1EFD85C152BA}"/>
+              </a:ext>
+            </a:extLst>
+          </p:cNvPr>
+          <p:cNvSpPr txBox="1"/>
+          <p:nvPr/>
+        </p:nvSpPr>
+        <p:spPr>
+          <a:xfrm>
+            <a:off x="213360" y="6150169"/>
+            <a:ext cx="11978640" cy="784830"/>
+          </a:xfrm>
+          <a:prstGeom prst="rect">
+            <a:avLst/>
+          </a:prstGeom>
+          <a:noFill/>
+        </p:spPr>
+        <p:txBody>
+          <a:bodyPr wrap="square" rtlCol="0">
+            <a:spAutoFit/>
+          </a:bodyPr>
+          <a:lstStyle/>
+          <a:p>
+            <a:r>
+              <a:rPr lang="es-ES" sz="900" b="1" dirty="0">
+                <a:solidFill>
+                  <a:schemeClr val="bg2">
+                    <a:lumMod val="75000"/>
+                  </a:schemeClr>
+                </a:solidFill>
+              </a:rPr>
+              <a:t>Fuente</a:t>
+            </a:r>
+            <a:r>
+              <a:rPr lang="es-ES" sz="900" dirty="0">
+                <a:solidFill>
+                  <a:schemeClr val="bg2">
+                    <a:lumMod val="75000"/>
+                  </a:schemeClr>
+                </a:solidFill>
+              </a:rPr>
+              <a:t>: Plataforma Nacional de Transparencia. (2024). </a:t>
+            </a:r>
+            <a:r>
+              <a:rPr lang="es-ES" sz="900" i="1" dirty="0">
+                <a:solidFill>
+                  <a:schemeClr val="bg2">
+                    <a:lumMod val="75000"/>
+                  </a:schemeClr>
+                </a:solidFill>
+              </a:rPr>
+              <a:t>Datos de reportes de llamadas de incidencias recibidas a través de llamadas telefónicas al número de emergencias 9-1-1 (2018-2025)</a:t>
+            </a:r>
+            <a:r>
+              <a:rPr lang="es-ES" sz="900" dirty="0">
+                <a:solidFill>
+                  <a:schemeClr val="bg2">
+                    <a:lumMod val="75000"/>
+                  </a:schemeClr>
+                </a:solidFill>
+              </a:rPr>
+              <a:t>. [Solicitud de Transparencia Folio: 261156825000213]. Recuperado de </a:t>
+            </a:r>
+            <a:r>
+              <a:rPr lang="es-ES" sz="900" dirty="0">
+                <a:solidFill>
+                  <a:schemeClr val="bg2">
+                    <a:lumMod val="75000"/>
+                  </a:schemeClr>
+                </a:solidFill>
+                <a:hlinkClick r:id="rId9"/>
+              </a:rPr>
+              <a:t>https://www.plataformanacionaldetransparencia.org.mx</a:t>
+            </a:r>
+            <a:endParaRPr lang="es-ES" sz="900" dirty="0">
+              <a:solidFill>
+                <a:schemeClr val="bg2">
+                  <a:lumMod val="75000"/>
+                </a:schemeClr>
+              </a:solidFill>
+            </a:endParaRPr>
+          </a:p>
+          <a:p>
+            <a:r>
+              <a:rPr lang="es-ES" sz="900" dirty="0">
+                <a:solidFill>
+                  <a:schemeClr val="bg2">
+                    <a:lumMod val="75000"/>
+                  </a:schemeClr>
+                </a:solidFill>
+              </a:rPr>
+              <a:t>Sonora en Datos. (2020). </a:t>
+            </a:r>
+            <a:r>
+              <a:rPr lang="es-ES" sz="900" dirty="0" err="1">
+                <a:solidFill>
+                  <a:schemeClr val="bg2">
+                    <a:lumMod val="75000"/>
+                  </a:schemeClr>
+                </a:solidFill>
+              </a:rPr>
+              <a:t>ColoniasSonora</a:t>
+            </a:r>
+            <a:r>
+              <a:rPr lang="es-ES" sz="900" dirty="0">
+                <a:solidFill>
+                  <a:schemeClr val="bg2">
+                    <a:lumMod val="75000"/>
+                  </a:schemeClr>
+                </a:solidFill>
+              </a:rPr>
+              <a:t>: Mapa interactivo de las colonias de Sonora. [Repositorio de GitHub y Mapa Web]. Recuperado de https://sonora-en-datos.github.io/ColoniasSonora/. De esta fuente se obtuvieron los polígonos geoespaciales y la información demográfica del Censo 2020 utilizada en este análisis.</a:t>
+            </a:r>
+          </a:p>
+          <a:p>
+            <a:endParaRPr lang="es-MX" sz="900" dirty="0">
+              <a:solidFill>
+                <a:schemeClr val="bg2">
+                  <a:lumMod val="75000"/>
+                </a:schemeClr>
+              </a:solidFill>
+            </a:endParaRPr>
           </a:p>
         </p:txBody>
       </p:sp>
     </p:spTree>
     <p:extLst>
       <p:ext uri="{BB962C8B-B14F-4D97-AF65-F5344CB8AC3E}">
-        <p14:creationId xmlns:p14="http://schemas.microsoft.com/office/powerpoint/2010/main" val="1149290121"/>
+        <p14:creationId xmlns:p14="http://schemas.microsoft.com/office/powerpoint/2010/main" val="1672516701"/>
       </p:ext>
     </p:extLst>
   </p:cSld>
@@ -3984,6 +7169,43 @@
           <a:chExt cx="0" cy="0"/>
         </a:xfrm>
       </p:grpSpPr>
+      <p:pic>
+        <p:nvPicPr>
+          <p:cNvPr id="5" name="Imagen 4" descr="Imagen en blanco y negro de una torre&#10;&#10;El contenido generado por IA puede ser incorrecto.">
+            <a:extLst>
+              <a:ext uri="{FF2B5EF4-FFF2-40B4-BE49-F238E27FC236}">
+                <a16:creationId xmlns:a16="http://schemas.microsoft.com/office/drawing/2014/main" id="{EE67A650-5DC5-B002-9E04-B97E536B5C4C}"/>
+              </a:ext>
+            </a:extLst>
+          </p:cNvPr>
+          <p:cNvPicPr>
+            <a:picLocks noChangeAspect="1"/>
+          </p:cNvPicPr>
+          <p:nvPr/>
+        </p:nvPicPr>
+        <p:blipFill>
+          <a:blip r:embed="rId2">
+            <a:extLst>
+              <a:ext uri="{28A0092B-C50C-407E-A947-70E740481C1C}">
+                <a14:useLocalDpi xmlns:a14="http://schemas.microsoft.com/office/drawing/2010/main" val="0"/>
+              </a:ext>
+            </a:extLst>
+          </a:blip>
+          <a:srcRect l="18243" t="21334" r="18388" b="25542"/>
+          <a:stretch>
+            <a:fillRect/>
+          </a:stretch>
+        </p:blipFill>
+        <p:spPr>
+          <a:xfrm>
+            <a:off x="6392908" y="3616960"/>
+            <a:ext cx="5799092" cy="3241040"/>
+          </a:xfrm>
+          <a:prstGeom prst="rect">
+            <a:avLst/>
+          </a:prstGeom>
+        </p:spPr>
+      </p:pic>
       <p:sp>
         <p:nvSpPr>
           <p:cNvPr id="2" name="Título 1">
@@ -4008,10 +7230,10 @@
           <a:lstStyle/>
           <a:p>
             <a:r>
-              <a:rPr lang="es-MX" sz="3200" b="1" dirty="0">
-                <a:latin typeface="Century Gothic" panose="020B0502020202020204" pitchFamily="34" charset="0"/>
-              </a:rPr>
-              <a:t>Conclusiones y próximos pasos</a:t>
+              <a:rPr lang="es-MX" sz="5400" b="1" dirty="0">
+                <a:latin typeface="Bebas Neue" panose="020B0606020202050201" pitchFamily="34" charset="0"/>
+              </a:rPr>
+              <a:t>Recomendaciones</a:t>
             </a:r>
           </a:p>
         </p:txBody>
@@ -4032,12 +7254,287 @@
             <p:ph idx="1"/>
           </p:nvPr>
         </p:nvSpPr>
-        <p:spPr/>
-        <p:txBody>
-          <a:bodyPr/>
+        <p:spPr>
+          <a:xfrm>
+            <a:off x="838200" y="1612900"/>
+            <a:ext cx="10515600" cy="4879975"/>
+          </a:xfrm>
+        </p:spPr>
+        <p:txBody>
+          <a:bodyPr>
+            <a:normAutofit/>
+          </a:bodyPr>
           <a:lstStyle/>
           <a:p>
-            <a:endParaRPr lang="es-MX" dirty="0"/>
+            <a:pPr>
+              <a:lnSpc>
+                <a:spcPct val="120000"/>
+              </a:lnSpc>
+            </a:pPr>
+            <a:r>
+              <a:rPr lang="es-ES" sz="1400" b="1" dirty="0">
+                <a:latin typeface="Arial" panose="020B0604020202020204" pitchFamily="34" charset="0"/>
+                <a:cs typeface="Arial" panose="020B0604020202020204" pitchFamily="34" charset="0"/>
+              </a:rPr>
+              <a:t>Inversión en programas de justicia cívica</a:t>
+            </a:r>
+            <a:r>
+              <a:rPr lang="es-ES" sz="1400" dirty="0">
+                <a:latin typeface="Arial" panose="020B0604020202020204" pitchFamily="34" charset="0"/>
+                <a:cs typeface="Arial" panose="020B0604020202020204" pitchFamily="34" charset="0"/>
+              </a:rPr>
+              <a:t> y unidades de resolución de conflictos vecinales para liberar recursos policiales.</a:t>
+            </a:r>
+          </a:p>
+          <a:p>
+            <a:pPr>
+              <a:lnSpc>
+                <a:spcPct val="120000"/>
+              </a:lnSpc>
+            </a:pPr>
+            <a:r>
+              <a:rPr lang="es-ES" sz="1400" b="1" dirty="0">
+                <a:latin typeface="Arial" panose="020B0604020202020204" pitchFamily="34" charset="0"/>
+                <a:cs typeface="Arial" panose="020B0604020202020204" pitchFamily="34" charset="0"/>
+              </a:rPr>
+              <a:t>Priorizar y robustece</a:t>
+            </a:r>
+            <a:r>
+              <a:rPr lang="es-ES" sz="1400" dirty="0">
+                <a:latin typeface="Arial" panose="020B0604020202020204" pitchFamily="34" charset="0"/>
+                <a:cs typeface="Arial" panose="020B0604020202020204" pitchFamily="34" charset="0"/>
+              </a:rPr>
+              <a:t>r las unidades especializadas en la </a:t>
+            </a:r>
+            <a:r>
+              <a:rPr lang="es-ES" sz="1400" b="1" dirty="0">
+                <a:latin typeface="Arial" panose="020B0604020202020204" pitchFamily="34" charset="0"/>
+                <a:cs typeface="Arial" panose="020B0604020202020204" pitchFamily="34" charset="0"/>
+              </a:rPr>
+              <a:t>atención de la violencia interpersonal</a:t>
+            </a:r>
+            <a:r>
+              <a:rPr lang="es-ES" sz="1400" dirty="0">
+                <a:latin typeface="Arial" panose="020B0604020202020204" pitchFamily="34" charset="0"/>
+                <a:cs typeface="Arial" panose="020B0604020202020204" pitchFamily="34" charset="0"/>
+              </a:rPr>
+              <a:t> (familiar y de género)</a:t>
+            </a:r>
+          </a:p>
+          <a:p>
+            <a:pPr>
+              <a:lnSpc>
+                <a:spcPct val="120000"/>
+              </a:lnSpc>
+            </a:pPr>
+            <a:r>
+              <a:rPr lang="es-ES" sz="1400" b="1" dirty="0">
+                <a:latin typeface="Arial" panose="020B0604020202020204" pitchFamily="34" charset="0"/>
+                <a:cs typeface="Arial" panose="020B0604020202020204" pitchFamily="34" charset="0"/>
+              </a:rPr>
+              <a:t>Prioridad geográfica - </a:t>
+            </a:r>
+            <a:r>
+              <a:rPr lang="es-ES" sz="1400" dirty="0">
+                <a:latin typeface="Arial" panose="020B0604020202020204" pitchFamily="34" charset="0"/>
+                <a:cs typeface="Arial" panose="020B0604020202020204" pitchFamily="34" charset="0"/>
+              </a:rPr>
+              <a:t>asignación de patrullaje basada en la cobertura geográfica</a:t>
+            </a:r>
+          </a:p>
+          <a:p>
+            <a:pPr>
+              <a:lnSpc>
+                <a:spcPct val="120000"/>
+              </a:lnSpc>
+            </a:pPr>
+            <a:r>
+              <a:rPr lang="es-ES" sz="1400" b="1" dirty="0">
+                <a:latin typeface="Arial" panose="020B0604020202020204" pitchFamily="34" charset="0"/>
+                <a:cs typeface="Arial" panose="020B0604020202020204" pitchFamily="34" charset="0"/>
+              </a:rPr>
+              <a:t>Refuerzo a turnos de patrullaje nocturnos y de fin de semana</a:t>
+            </a:r>
+          </a:p>
+          <a:p>
+            <a:pPr>
+              <a:lnSpc>
+                <a:spcPct val="120000"/>
+              </a:lnSpc>
+            </a:pPr>
+            <a:r>
+              <a:rPr lang="es-ES" sz="1400" dirty="0">
+                <a:latin typeface="Arial" panose="020B0604020202020204" pitchFamily="34" charset="0"/>
+                <a:cs typeface="Arial" panose="020B0604020202020204" pitchFamily="34" charset="0"/>
+              </a:rPr>
+              <a:t>Desarrollo de </a:t>
+            </a:r>
+            <a:r>
+              <a:rPr lang="es-ES" sz="1400" b="1" dirty="0">
+                <a:latin typeface="Arial" panose="020B0604020202020204" pitchFamily="34" charset="0"/>
+                <a:cs typeface="Arial" panose="020B0604020202020204" pitchFamily="34" charset="0"/>
+              </a:rPr>
+              <a:t>estrategia de seguridad comercial y logística </a:t>
+            </a:r>
+            <a:r>
+              <a:rPr lang="es-ES" sz="1400" dirty="0">
+                <a:latin typeface="Arial" panose="020B0604020202020204" pitchFamily="34" charset="0"/>
+                <a:cs typeface="Arial" panose="020B0604020202020204" pitchFamily="34" charset="0"/>
+              </a:rPr>
+              <a:t>enfocada en el robo de vehículos y negocios </a:t>
+            </a:r>
+            <a:r>
+              <a:rPr lang="es-ES" sz="1400" b="1" dirty="0">
+                <a:latin typeface="Arial" panose="020B0604020202020204" pitchFamily="34" charset="0"/>
+                <a:cs typeface="Arial" panose="020B0604020202020204" pitchFamily="34" charset="0"/>
+              </a:rPr>
+              <a:t>para zonas industriales</a:t>
+            </a:r>
+            <a:endParaRPr lang="es-MX" sz="1400" b="1" dirty="0">
+              <a:latin typeface="Arial" panose="020B0604020202020204" pitchFamily="34" charset="0"/>
+              <a:cs typeface="Arial" panose="020B0604020202020204" pitchFamily="34" charset="0"/>
+            </a:endParaRPr>
+          </a:p>
+          <a:p>
+            <a:pPr marL="0" indent="0">
+              <a:lnSpc>
+                <a:spcPct val="120000"/>
+              </a:lnSpc>
+              <a:buNone/>
+            </a:pPr>
+            <a:r>
+              <a:rPr lang="es-MX" sz="5400" b="1" dirty="0">
+                <a:latin typeface="Bebas Neue" panose="020B0606020202050201" pitchFamily="34" charset="0"/>
+              </a:rPr>
+              <a:t>próximos pasos</a:t>
+            </a:r>
+            <a:endParaRPr lang="es-MX" sz="5400" b="1" dirty="0">
+              <a:latin typeface="Arial" panose="020B0604020202020204" pitchFamily="34" charset="0"/>
+              <a:cs typeface="Arial" panose="020B0604020202020204" pitchFamily="34" charset="0"/>
+            </a:endParaRPr>
+          </a:p>
+          <a:p>
+            <a:pPr>
+              <a:lnSpc>
+                <a:spcPct val="120000"/>
+              </a:lnSpc>
+            </a:pPr>
+            <a:r>
+              <a:rPr lang="es-MX" sz="1400" b="1" dirty="0">
+                <a:latin typeface="Arial" panose="020B0604020202020204" pitchFamily="34" charset="0"/>
+                <a:cs typeface="Arial" panose="020B0604020202020204" pitchFamily="34" charset="0"/>
+              </a:rPr>
+              <a:t>Estratificar análisis</a:t>
+            </a:r>
+            <a:r>
+              <a:rPr lang="es-MX" sz="1400" dirty="0">
+                <a:latin typeface="Arial" panose="020B0604020202020204" pitchFamily="34" charset="0"/>
+                <a:cs typeface="Arial" panose="020B0604020202020204" pitchFamily="34" charset="0"/>
+              </a:rPr>
+              <a:t>: Separar zonas industriales de residenciales para obtener mejores resultados</a:t>
+            </a:r>
+          </a:p>
+          <a:p>
+            <a:pPr>
+              <a:lnSpc>
+                <a:spcPct val="120000"/>
+              </a:lnSpc>
+            </a:pPr>
+            <a:r>
+              <a:rPr lang="es-MX" sz="1400" b="1" dirty="0" err="1">
+                <a:latin typeface="Arial" panose="020B0604020202020204" pitchFamily="34" charset="0"/>
+                <a:cs typeface="Arial" panose="020B0604020202020204" pitchFamily="34" charset="0"/>
+              </a:rPr>
+              <a:t>Clustering</a:t>
+            </a:r>
+            <a:r>
+              <a:rPr lang="es-MX" sz="1400" dirty="0">
+                <a:latin typeface="Arial" panose="020B0604020202020204" pitchFamily="34" charset="0"/>
+                <a:cs typeface="Arial" panose="020B0604020202020204" pitchFamily="34" charset="0"/>
+              </a:rPr>
+              <a:t>: Agrupar colonias similares para políticas públicas diferenciadas</a:t>
+            </a:r>
+          </a:p>
+          <a:p>
+            <a:pPr>
+              <a:lnSpc>
+                <a:spcPct val="120000"/>
+              </a:lnSpc>
+            </a:pPr>
+            <a:r>
+              <a:rPr lang="es-MX" sz="1400" b="1" dirty="0">
+                <a:latin typeface="Arial" panose="020B0604020202020204" pitchFamily="34" charset="0"/>
+                <a:cs typeface="Arial" panose="020B0604020202020204" pitchFamily="34" charset="0"/>
+              </a:rPr>
+              <a:t>Predicción</a:t>
+            </a:r>
+            <a:r>
+              <a:rPr lang="es-MX" sz="1400" dirty="0">
+                <a:latin typeface="Arial" panose="020B0604020202020204" pitchFamily="34" charset="0"/>
+                <a:cs typeface="Arial" panose="020B0604020202020204" pitchFamily="34" charset="0"/>
+              </a:rPr>
+              <a:t>: Modelar tasa de incidencia usando variables demográficas</a:t>
+            </a:r>
+          </a:p>
+          <a:p>
+            <a:pPr>
+              <a:lnSpc>
+                <a:spcPct val="120000"/>
+              </a:lnSpc>
+            </a:pPr>
+            <a:r>
+              <a:rPr lang="es-MX" sz="1400" b="1" dirty="0">
+                <a:latin typeface="Arial" panose="020B0604020202020204" pitchFamily="34" charset="0"/>
+                <a:cs typeface="Arial" panose="020B0604020202020204" pitchFamily="34" charset="0"/>
+              </a:rPr>
+              <a:t>Análisis geoespacial</a:t>
+            </a:r>
+            <a:r>
+              <a:rPr lang="es-MX" sz="1400" dirty="0">
+                <a:latin typeface="Arial" panose="020B0604020202020204" pitchFamily="34" charset="0"/>
+                <a:cs typeface="Arial" panose="020B0604020202020204" pitchFamily="34" charset="0"/>
+              </a:rPr>
+              <a:t>: Detectar </a:t>
+            </a:r>
+            <a:r>
+              <a:rPr lang="es-MX" sz="1400" dirty="0" err="1">
+                <a:latin typeface="Arial" panose="020B0604020202020204" pitchFamily="34" charset="0"/>
+                <a:cs typeface="Arial" panose="020B0604020202020204" pitchFamily="34" charset="0"/>
+              </a:rPr>
+              <a:t>clusters</a:t>
+            </a:r>
+            <a:r>
+              <a:rPr lang="es-MX" sz="1400" dirty="0">
+                <a:latin typeface="Arial" panose="020B0604020202020204" pitchFamily="34" charset="0"/>
+                <a:cs typeface="Arial" panose="020B0604020202020204" pitchFamily="34" charset="0"/>
+              </a:rPr>
+              <a:t> geográficos (</a:t>
+            </a:r>
+            <a:r>
+              <a:rPr lang="es-MX" sz="1400" dirty="0" err="1">
+                <a:latin typeface="Arial" panose="020B0604020202020204" pitchFamily="34" charset="0"/>
+                <a:cs typeface="Arial" panose="020B0604020202020204" pitchFamily="34" charset="0"/>
+              </a:rPr>
+              <a:t>hotspots</a:t>
+            </a:r>
+            <a:r>
+              <a:rPr lang="es-MX" sz="1400" dirty="0">
+                <a:latin typeface="Arial" panose="020B0604020202020204" pitchFamily="34" charset="0"/>
+                <a:cs typeface="Arial" panose="020B0604020202020204" pitchFamily="34" charset="0"/>
+              </a:rPr>
+              <a:t>)</a:t>
+            </a:r>
+          </a:p>
+          <a:p>
+            <a:pPr>
+              <a:lnSpc>
+                <a:spcPct val="120000"/>
+              </a:lnSpc>
+            </a:pPr>
+            <a:endParaRPr lang="es-MX" sz="1300" dirty="0">
+              <a:latin typeface="Arial" panose="020B0604020202020204" pitchFamily="34" charset="0"/>
+              <a:cs typeface="Arial" panose="020B0604020202020204" pitchFamily="34" charset="0"/>
+            </a:endParaRPr>
           </a:p>
         </p:txBody>
       </p:sp>

</xml_diff>